<commit_message>
Presentation modified, preparation-kopg.txt added
</commit_message>
<xml_diff>
--- a/PROJEKTUMFELD.pptx
+++ b/PROJEKTUMFELD.pptx
@@ -5,7 +5,7 @@
     <p:sldMasterId id="2147483648" r:id="rId1"/>
   </p:sldMasterIdLst>
   <p:notesMasterIdLst>
-    <p:notesMasterId r:id="rId20"/>
+    <p:notesMasterId r:id="rId24"/>
   </p:notesMasterIdLst>
   <p:sldIdLst>
     <p:sldId id="256" r:id="rId2"/>
@@ -14,18 +14,22 @@
     <p:sldId id="259" r:id="rId5"/>
     <p:sldId id="260" r:id="rId6"/>
     <p:sldId id="261" r:id="rId7"/>
-    <p:sldId id="263" r:id="rId8"/>
-    <p:sldId id="262" r:id="rId9"/>
-    <p:sldId id="265" r:id="rId10"/>
-    <p:sldId id="264" r:id="rId11"/>
-    <p:sldId id="266" r:id="rId12"/>
-    <p:sldId id="267" r:id="rId13"/>
-    <p:sldId id="268" r:id="rId14"/>
-    <p:sldId id="269" r:id="rId15"/>
-    <p:sldId id="270" r:id="rId16"/>
-    <p:sldId id="271" r:id="rId17"/>
-    <p:sldId id="272" r:id="rId18"/>
-    <p:sldId id="273" r:id="rId19"/>
+    <p:sldId id="274" r:id="rId8"/>
+    <p:sldId id="263" r:id="rId9"/>
+    <p:sldId id="262" r:id="rId10"/>
+    <p:sldId id="265" r:id="rId11"/>
+    <p:sldId id="264" r:id="rId12"/>
+    <p:sldId id="266" r:id="rId13"/>
+    <p:sldId id="275" r:id="rId14"/>
+    <p:sldId id="276" r:id="rId15"/>
+    <p:sldId id="267" r:id="rId16"/>
+    <p:sldId id="268" r:id="rId17"/>
+    <p:sldId id="269" r:id="rId18"/>
+    <p:sldId id="270" r:id="rId19"/>
+    <p:sldId id="271" r:id="rId20"/>
+    <p:sldId id="272" r:id="rId21"/>
+    <p:sldId id="277" r:id="rId22"/>
+    <p:sldId id="273" r:id="rId23"/>
   </p:sldIdLst>
   <p:sldSz cx="9144000" cy="6858000" type="screen4x3"/>
   <p:notesSz cx="6858000" cy="9144000"/>
@@ -124,6 +128,22 @@
       </a:defRPr>
     </a:lvl9pPr>
   </p:defaultTextStyle>
+  <p:extLst>
+    <p:ext uri="{EFAFB233-063F-42B5-8137-9DF3F51BA10A}">
+      <p15:sldGuideLst xmlns:p15="http://schemas.microsoft.com/office/powerpoint/2012/main">
+        <p15:guide id="1" orient="horz" pos="2160">
+          <p15:clr>
+            <a:srgbClr val="A4A3A4"/>
+          </p15:clr>
+        </p15:guide>
+        <p15:guide id="2" pos="2880">
+          <p15:clr>
+            <a:srgbClr val="A4A3A4"/>
+          </p15:clr>
+        </p15:guide>
+      </p15:sldGuideLst>
+    </p:ext>
+  </p:extLst>
 </p:presentation>
 </file>
 
@@ -209,7 +229,7 @@
           <a:p>
             <a:fld id="{C6BDB6F8-E347-490B-8442-9139CF6909D7}" type="datetimeFigureOut">
               <a:rPr lang="en-GB" smtClean="0"/>
-              <a:t>08/06/2015</a:t>
+              <a:t>12/06/2015</a:t>
             </a:fld>
             <a:endParaRPr lang="en-GB"/>
           </a:p>
@@ -648,7 +668,7 @@
           <a:p>
             <a:fld id="{87955FE0-BDF8-41A5-9B73-D424FF100DB6}" type="slidenum">
               <a:rPr lang="en-GB" smtClean="0"/>
-              <a:t>12</a:t>
+              <a:t>15</a:t>
             </a:fld>
             <a:endParaRPr lang="en-GB"/>
           </a:p>
@@ -754,7 +774,7 @@
           <a:p>
             <a:fld id="{87955FE0-BDF8-41A5-9B73-D424FF100DB6}" type="slidenum">
               <a:rPr lang="en-GB" smtClean="0"/>
-              <a:t>13</a:t>
+              <a:t>16</a:t>
             </a:fld>
             <a:endParaRPr lang="en-GB"/>
           </a:p>
@@ -860,7 +880,7 @@
           <a:p>
             <a:fld id="{87955FE0-BDF8-41A5-9B73-D424FF100DB6}" type="slidenum">
               <a:rPr lang="en-GB" smtClean="0"/>
-              <a:t>14</a:t>
+              <a:t>17</a:t>
             </a:fld>
             <a:endParaRPr lang="en-GB"/>
           </a:p>
@@ -966,7 +986,7 @@
           <a:p>
             <a:fld id="{87955FE0-BDF8-41A5-9B73-D424FF100DB6}" type="slidenum">
               <a:rPr lang="en-GB" smtClean="0"/>
-              <a:t>15</a:t>
+              <a:t>18</a:t>
             </a:fld>
             <a:endParaRPr lang="en-GB"/>
           </a:p>
@@ -1072,7 +1092,7 @@
           <a:p>
             <a:fld id="{87955FE0-BDF8-41A5-9B73-D424FF100DB6}" type="slidenum">
               <a:rPr lang="en-GB" smtClean="0"/>
-              <a:t>16</a:t>
+              <a:t>19</a:t>
             </a:fld>
             <a:endParaRPr lang="en-GB"/>
           </a:p>
@@ -1082,6 +1102,112 @@
     <p:extLst>
       <p:ext uri="{BB962C8B-B14F-4D97-AF65-F5344CB8AC3E}">
         <p14:creationId xmlns:p14="http://schemas.microsoft.com/office/powerpoint/2010/main" val="2824070072"/>
+      </p:ext>
+    </p:extLst>
+  </p:cSld>
+  <p:clrMapOvr>
+    <a:masterClrMapping/>
+  </p:clrMapOvr>
+</p:notes>
+</file>
+
+<file path=ppt/notesSlides/notesSlide15.xml><?xml version="1.0" encoding="utf-8"?>
+<p:notes xmlns:a="http://schemas.openxmlformats.org/drawingml/2006/main" xmlns:r="http://schemas.openxmlformats.org/officeDocument/2006/relationships" xmlns:p="http://schemas.openxmlformats.org/presentationml/2006/main">
+  <p:cSld>
+    <p:spTree>
+      <p:nvGrpSpPr>
+        <p:cNvPr id="1" name=""/>
+        <p:cNvGrpSpPr/>
+        <p:nvPr/>
+      </p:nvGrpSpPr>
+      <p:grpSpPr>
+        <a:xfrm>
+          <a:off x="0" y="0"/>
+          <a:ext cx="0" cy="0"/>
+          <a:chOff x="0" y="0"/>
+          <a:chExt cx="0" cy="0"/>
+        </a:xfrm>
+      </p:grpSpPr>
+      <p:sp>
+        <p:nvSpPr>
+          <p:cNvPr id="2" name="Slide Image Placeholder 1"/>
+          <p:cNvSpPr>
+            <a:spLocks noGrp="1" noRot="1" noChangeAspect="1"/>
+          </p:cNvSpPr>
+          <p:nvPr>
+            <p:ph type="sldImg"/>
+          </p:nvPr>
+        </p:nvSpPr>
+        <p:spPr/>
+      </p:sp>
+      <p:sp>
+        <p:nvSpPr>
+          <p:cNvPr id="3" name="Notes Placeholder 2"/>
+          <p:cNvSpPr>
+            <a:spLocks noGrp="1"/>
+          </p:cNvSpPr>
+          <p:nvPr>
+            <p:ph type="body" idx="1"/>
+          </p:nvPr>
+        </p:nvSpPr>
+        <p:spPr/>
+        <p:txBody>
+          <a:bodyPr/>
+          <a:lstStyle/>
+          <a:p>
+            <a:r>
+              <a:rPr lang="en-GB" dirty="0" smtClean="0"/>
+              <a:t>Triangulation:</a:t>
+            </a:r>
+            <a:r>
+              <a:rPr lang="en-GB" baseline="0" dirty="0" smtClean="0"/>
+              <a:t> </a:t>
+            </a:r>
+          </a:p>
+          <a:p>
+            <a:endParaRPr lang="en-GB" baseline="0" dirty="0" smtClean="0"/>
+          </a:p>
+          <a:p>
+            <a:r>
+              <a:rPr lang="de-DE" dirty="0" smtClean="0"/>
+              <a:t>Durch die Projektion eines Laserstrahls auf einen entfernten Gegenstand wird das Licht des Strahls reflektiert und an einen angebrachten Detektor (z.B. eine Kamera) weitergeleitet. Man erh¨alt den Abstand zwischen Sender und Empf¨anger und die Entfernung zum Objekt kann mit der angegebenen Triangulationsbeziehung berechnet werden</a:t>
+            </a:r>
+          </a:p>
+          <a:p>
+            <a:endParaRPr lang="de-DE" dirty="0" smtClean="0"/>
+          </a:p>
+          <a:p>
+            <a:endParaRPr lang="en-GB" dirty="0"/>
+          </a:p>
+        </p:txBody>
+      </p:sp>
+      <p:sp>
+        <p:nvSpPr>
+          <p:cNvPr id="4" name="Slide Number Placeholder 3"/>
+          <p:cNvSpPr>
+            <a:spLocks noGrp="1"/>
+          </p:cNvSpPr>
+          <p:nvPr>
+            <p:ph type="sldNum" sz="quarter" idx="10"/>
+          </p:nvPr>
+        </p:nvSpPr>
+        <p:spPr/>
+        <p:txBody>
+          <a:bodyPr/>
+          <a:lstStyle/>
+          <a:p>
+            <a:fld id="{87955FE0-BDF8-41A5-9B73-D424FF100DB6}" type="slidenum">
+              <a:rPr lang="en-GB" smtClean="0"/>
+              <a:t>21</a:t>
+            </a:fld>
+            <a:endParaRPr lang="en-GB"/>
+          </a:p>
+        </p:txBody>
+      </p:sp>
+    </p:spTree>
+    <p:extLst>
+      <p:ext uri="{BB962C8B-B14F-4D97-AF65-F5344CB8AC3E}">
+        <p14:creationId xmlns:p14="http://schemas.microsoft.com/office/powerpoint/2010/main" val="2146467597"/>
       </p:ext>
     </p:extLst>
   </p:cSld>
@@ -1815,7 +1941,7 @@
           <a:p>
             <a:fld id="{87955FE0-BDF8-41A5-9B73-D424FF100DB6}" type="slidenum">
               <a:rPr lang="en-GB" smtClean="0"/>
-              <a:t>7</a:t>
+              <a:t>8</a:t>
             </a:fld>
             <a:endParaRPr lang="en-GB"/>
           </a:p>
@@ -1921,7 +2047,7 @@
           <a:p>
             <a:fld id="{87955FE0-BDF8-41A5-9B73-D424FF100DB6}" type="slidenum">
               <a:rPr lang="en-GB" smtClean="0"/>
-              <a:t>8</a:t>
+              <a:t>9</a:t>
             </a:fld>
             <a:endParaRPr lang="en-GB"/>
           </a:p>
@@ -2008,7 +2134,7 @@
           <a:p>
             <a:fld id="{87955FE0-BDF8-41A5-9B73-D424FF100DB6}" type="slidenum">
               <a:rPr lang="en-GB" smtClean="0"/>
-              <a:t>9</a:t>
+              <a:t>10</a:t>
             </a:fld>
             <a:endParaRPr lang="en-GB"/>
           </a:p>
@@ -2092,7 +2218,7 @@
           <a:p>
             <a:fld id="{87955FE0-BDF8-41A5-9B73-D424FF100DB6}" type="slidenum">
               <a:rPr lang="en-GB" smtClean="0"/>
-              <a:t>10</a:t>
+              <a:t>11</a:t>
             </a:fld>
             <a:endParaRPr lang="en-GB"/>
           </a:p>
@@ -2198,7 +2324,7 @@
           <a:p>
             <a:fld id="{87955FE0-BDF8-41A5-9B73-D424FF100DB6}" type="slidenum">
               <a:rPr lang="en-GB" smtClean="0"/>
-              <a:t>11</a:t>
+              <a:t>12</a:t>
             </a:fld>
             <a:endParaRPr lang="en-GB"/>
           </a:p>
@@ -2398,7 +2524,7 @@
           <a:p>
             <a:fld id="{C475CAD8-5812-4FDB-A3C6-F1CB4A7FA3E6}" type="datetime1">
               <a:rPr lang="en-GB" smtClean="0"/>
-              <a:t>08/06/2015</a:t>
+              <a:t>12/06/2015</a:t>
             </a:fld>
             <a:endParaRPr lang="en-GB"/>
           </a:p>
@@ -2568,7 +2694,7 @@
           <a:p>
             <a:fld id="{1800C608-D9D5-485F-BFDC-0404036D7B86}" type="datetime1">
               <a:rPr lang="en-GB" smtClean="0"/>
-              <a:t>08/06/2015</a:t>
+              <a:t>12/06/2015</a:t>
             </a:fld>
             <a:endParaRPr lang="en-GB"/>
           </a:p>
@@ -2748,7 +2874,7 @@
           <a:p>
             <a:fld id="{3C52B9E6-F8D4-43E4-B802-6AF6CD4ABACC}" type="datetime1">
               <a:rPr lang="en-GB" smtClean="0"/>
-              <a:t>08/06/2015</a:t>
+              <a:t>12/06/2015</a:t>
             </a:fld>
             <a:endParaRPr lang="en-GB"/>
           </a:p>
@@ -2918,7 +3044,7 @@
           <a:p>
             <a:fld id="{46E45580-5301-406C-AC9D-4771DD0B7015}" type="datetime1">
               <a:rPr lang="en-GB" smtClean="0"/>
-              <a:t>08/06/2015</a:t>
+              <a:t>12/06/2015</a:t>
             </a:fld>
             <a:endParaRPr lang="en-GB"/>
           </a:p>
@@ -3164,7 +3290,7 @@
           <a:p>
             <a:fld id="{33C28B8C-8B04-462A-B56F-C17487BEC99E}" type="datetime1">
               <a:rPr lang="en-GB" smtClean="0"/>
-              <a:t>08/06/2015</a:t>
+              <a:t>12/06/2015</a:t>
             </a:fld>
             <a:endParaRPr lang="en-GB"/>
           </a:p>
@@ -3452,7 +3578,7 @@
           <a:p>
             <a:fld id="{E74ED27C-92C3-4A02-90F4-B99DAB25916E}" type="datetime1">
               <a:rPr lang="en-GB" smtClean="0"/>
-              <a:t>08/06/2015</a:t>
+              <a:t>12/06/2015</a:t>
             </a:fld>
             <a:endParaRPr lang="en-GB"/>
           </a:p>
@@ -3874,7 +4000,7 @@
           <a:p>
             <a:fld id="{B25B1FF7-BFDE-425F-9092-3C0B4BD1E350}" type="datetime1">
               <a:rPr lang="en-GB" smtClean="0"/>
-              <a:t>08/06/2015</a:t>
+              <a:t>12/06/2015</a:t>
             </a:fld>
             <a:endParaRPr lang="en-GB"/>
           </a:p>
@@ -3992,7 +4118,7 @@
           <a:p>
             <a:fld id="{DF2BE6B6-968B-459D-8E86-58AC4806A286}" type="datetime1">
               <a:rPr lang="en-GB" smtClean="0"/>
-              <a:t>08/06/2015</a:t>
+              <a:t>12/06/2015</a:t>
             </a:fld>
             <a:endParaRPr lang="en-GB"/>
           </a:p>
@@ -4087,7 +4213,7 @@
           <a:p>
             <a:fld id="{496351FB-2D59-4E15-AA94-8CD1C963F31B}" type="datetime1">
               <a:rPr lang="en-GB" smtClean="0"/>
-              <a:t>08/06/2015</a:t>
+              <a:t>12/06/2015</a:t>
             </a:fld>
             <a:endParaRPr lang="en-GB"/>
           </a:p>
@@ -4364,7 +4490,7 @@
           <a:p>
             <a:fld id="{71B4ADBB-0BF4-4C35-90B0-6E626DEE1697}" type="datetime1">
               <a:rPr lang="en-GB" smtClean="0"/>
-              <a:t>08/06/2015</a:t>
+              <a:t>12/06/2015</a:t>
             </a:fld>
             <a:endParaRPr lang="en-GB"/>
           </a:p>
@@ -4617,7 +4743,7 @@
           <a:p>
             <a:fld id="{5130F08D-64CB-4599-8A19-186CC4A781EE}" type="datetime1">
               <a:rPr lang="en-GB" smtClean="0"/>
-              <a:t>08/06/2015</a:t>
+              <a:t>12/06/2015</a:t>
             </a:fld>
             <a:endParaRPr lang="en-GB"/>
           </a:p>
@@ -4830,7 +4956,7 @@
           <a:p>
             <a:fld id="{E38099CE-2B1B-495A-8F93-7ECEBDC714F4}" type="datetime1">
               <a:rPr lang="en-GB" smtClean="0"/>
-              <a:t>08/06/2015</a:t>
+              <a:t>12/06/2015</a:t>
             </a:fld>
             <a:endParaRPr lang="en-GB"/>
           </a:p>
@@ -5250,7 +5376,12 @@
             <p:ph type="subTitle" idx="1"/>
           </p:nvPr>
         </p:nvSpPr>
-        <p:spPr/>
+        <p:spPr>
+          <a:xfrm>
+            <a:off x="1371600" y="4365104"/>
+            <a:ext cx="6400800" cy="1273696"/>
+          </a:xfrm>
+        </p:spPr>
         <p:txBody>
           <a:bodyPr/>
           <a:lstStyle/>
@@ -5270,13 +5401,7 @@
               <a:rPr lang="en-GB" dirty="0" smtClean="0"/>
               <a:t>5AHITT</a:t>
             </a:r>
-          </a:p>
-          <a:p>
-            <a:r>
-              <a:rPr lang="en-GB" dirty="0" smtClean="0"/>
-              <a:t>08/06/2015</a:t>
-            </a:r>
-            <a:endParaRPr lang="en-GB" dirty="0"/>
+            <a:endParaRPr lang="en-GB" dirty="0" smtClean="0"/>
           </a:p>
         </p:txBody>
       </p:sp>
@@ -5313,10 +5438,177 @@
   <p:clrMapOvr>
     <a:masterClrMapping/>
   </p:clrMapOvr>
+  <p:timing>
+    <p:tnLst>
+      <p:par>
+        <p:cTn id="1" dur="indefinite" restart="never" nodeType="tmRoot"/>
+      </p:par>
+    </p:tnLst>
+  </p:timing>
 </p:sld>
 </file>
 
 <file path=ppt/slides/slide10.xml><?xml version="1.0" encoding="utf-8"?>
+<p:sld xmlns:a="http://schemas.openxmlformats.org/drawingml/2006/main" xmlns:r="http://schemas.openxmlformats.org/officeDocument/2006/relationships" xmlns:p="http://schemas.openxmlformats.org/presentationml/2006/main">
+  <p:cSld>
+    <p:spTree>
+      <p:nvGrpSpPr>
+        <p:cNvPr id="1" name=""/>
+        <p:cNvGrpSpPr/>
+        <p:nvPr/>
+      </p:nvGrpSpPr>
+      <p:grpSpPr>
+        <a:xfrm>
+          <a:off x="0" y="0"/>
+          <a:ext cx="0" cy="0"/>
+          <a:chOff x="0" y="0"/>
+          <a:chExt cx="0" cy="0"/>
+        </a:xfrm>
+      </p:grpSpPr>
+      <p:sp>
+        <p:nvSpPr>
+          <p:cNvPr id="2" name="Title 1"/>
+          <p:cNvSpPr>
+            <a:spLocks noGrp="1"/>
+          </p:cNvSpPr>
+          <p:nvPr>
+            <p:ph type="title"/>
+          </p:nvPr>
+        </p:nvSpPr>
+        <p:spPr/>
+        <p:txBody>
+          <a:bodyPr/>
+          <a:lstStyle/>
+          <a:p>
+            <a:r>
+              <a:rPr lang="en-GB" dirty="0" err="1" smtClean="0"/>
+              <a:t>Positionssensoren</a:t>
+            </a:r>
+            <a:endParaRPr lang="en-GB" dirty="0"/>
+          </a:p>
+        </p:txBody>
+      </p:sp>
+      <p:sp>
+        <p:nvSpPr>
+          <p:cNvPr id="4" name="Slide Number Placeholder 3"/>
+          <p:cNvSpPr>
+            <a:spLocks noGrp="1"/>
+          </p:cNvSpPr>
+          <p:nvPr>
+            <p:ph type="sldNum" sz="quarter" idx="12"/>
+          </p:nvPr>
+        </p:nvSpPr>
+        <p:spPr/>
+        <p:txBody>
+          <a:bodyPr/>
+          <a:lstStyle/>
+          <a:p>
+            <a:r>
+              <a:rPr lang="en-GB" sz="2000" dirty="0" smtClean="0"/>
+              <a:t>9</a:t>
+            </a:r>
+            <a:endParaRPr lang="en-GB" sz="2000" dirty="0"/>
+          </a:p>
+        </p:txBody>
+      </p:sp>
+      <p:pic>
+        <p:nvPicPr>
+          <p:cNvPr id="7" name="Picture 6"/>
+          <p:cNvPicPr>
+            <a:picLocks noChangeAspect="1"/>
+          </p:cNvPicPr>
+          <p:nvPr/>
+        </p:nvPicPr>
+        <p:blipFill rotWithShape="1">
+          <a:blip r:embed="rId3" cstate="print">
+            <a:extLst>
+              <a:ext uri="{28A0092B-C50C-407E-A947-70E740481C1C}">
+                <a14:useLocalDpi xmlns:a14="http://schemas.microsoft.com/office/drawing/2010/main" val="0"/>
+              </a:ext>
+            </a:extLst>
+          </a:blip>
+          <a:srcRect l="22438" t="3801" r="15350" b="17451"/>
+          <a:stretch/>
+        </p:blipFill>
+        <p:spPr>
+          <a:xfrm>
+            <a:off x="1475656" y="332656"/>
+            <a:ext cx="6569970" cy="6237312"/>
+          </a:xfrm>
+          <a:prstGeom prst="rect">
+            <a:avLst/>
+          </a:prstGeom>
+        </p:spPr>
+      </p:pic>
+      <p:sp>
+        <p:nvSpPr>
+          <p:cNvPr id="6" name="Right Arrow 5"/>
+          <p:cNvSpPr/>
+          <p:nvPr/>
+        </p:nvSpPr>
+        <p:spPr>
+          <a:xfrm rot="18838342">
+            <a:off x="1474533" y="5068395"/>
+            <a:ext cx="1968420" cy="953992"/>
+          </a:xfrm>
+          <a:prstGeom prst="rightArrow">
+            <a:avLst/>
+          </a:prstGeom>
+          <a:solidFill>
+            <a:srgbClr val="92D050"/>
+          </a:solidFill>
+          <a:ln w="76200">
+            <a:solidFill>
+              <a:srgbClr val="00B050"/>
+            </a:solidFill>
+          </a:ln>
+        </p:spPr>
+        <p:style>
+          <a:lnRef idx="2">
+            <a:schemeClr val="accent1">
+              <a:shade val="50000"/>
+            </a:schemeClr>
+          </a:lnRef>
+          <a:fillRef idx="1">
+            <a:schemeClr val="accent1"/>
+          </a:fillRef>
+          <a:effectRef idx="0">
+            <a:schemeClr val="accent1"/>
+          </a:effectRef>
+          <a:fontRef idx="minor">
+            <a:schemeClr val="lt1"/>
+          </a:fontRef>
+        </p:style>
+        <p:txBody>
+          <a:bodyPr rtlCol="0" anchor="ctr"/>
+          <a:lstStyle/>
+          <a:p>
+            <a:pPr algn="ctr"/>
+            <a:endParaRPr lang="en-GB"/>
+          </a:p>
+        </p:txBody>
+      </p:sp>
+    </p:spTree>
+    <p:extLst>
+      <p:ext uri="{BB962C8B-B14F-4D97-AF65-F5344CB8AC3E}">
+        <p14:creationId xmlns:p14="http://schemas.microsoft.com/office/powerpoint/2010/main" val="2056909074"/>
+      </p:ext>
+    </p:extLst>
+  </p:cSld>
+  <p:clrMapOvr>
+    <a:masterClrMapping/>
+  </p:clrMapOvr>
+  <p:timing>
+    <p:tnLst>
+      <p:par>
+        <p:cTn id="1" dur="indefinite" restart="never" nodeType="tmRoot"/>
+      </p:par>
+    </p:tnLst>
+  </p:timing>
+</p:sld>
+</file>
+
+<file path=ppt/slides/slide11.xml><?xml version="1.0" encoding="utf-8"?>
 <p:sld xmlns:a="http://schemas.openxmlformats.org/drawingml/2006/main" xmlns:r="http://schemas.openxmlformats.org/officeDocument/2006/relationships" xmlns:p="http://schemas.openxmlformats.org/presentationml/2006/main">
   <p:cSld>
     <p:spTree>
@@ -5414,7 +5706,7 @@
           <a:p>
             <a:fld id="{169B6969-B37F-4A17-ACF5-55252B4AE136}" type="slidenum">
               <a:rPr lang="en-GB" sz="2000" smtClean="0"/>
-              <a:t>10</a:t>
+              <a:t>11</a:t>
             </a:fld>
             <a:endParaRPr lang="en-GB" sz="2000" dirty="0"/>
           </a:p>
@@ -5422,13 +5714,13 @@
       </p:sp>
       <p:sp>
         <p:nvSpPr>
-          <p:cNvPr id="10" name="Oval 9"/>
+          <p:cNvPr id="6" name="Oval 5"/>
           <p:cNvSpPr/>
           <p:nvPr/>
         </p:nvSpPr>
         <p:spPr>
           <a:xfrm>
-            <a:off x="5148064" y="836712"/>
+            <a:off x="6588224" y="877257"/>
             <a:ext cx="1224136" cy="607527"/>
           </a:xfrm>
           <a:prstGeom prst="ellipse">
@@ -5468,13 +5760,13 @@
       </p:sp>
       <p:sp>
         <p:nvSpPr>
-          <p:cNvPr id="11" name="Right Arrow 10"/>
+          <p:cNvPr id="7" name="Right Arrow 6"/>
           <p:cNvSpPr/>
           <p:nvPr/>
         </p:nvSpPr>
         <p:spPr>
-          <a:xfrm rot="2295363">
-            <a:off x="4419244" y="296651"/>
+          <a:xfrm rot="8607992">
+            <a:off x="7781987" y="296650"/>
             <a:ext cx="864096" cy="504056"/>
           </a:xfrm>
           <a:prstGeom prst="rightArrow">
@@ -5524,291 +5816,13 @@
   <p:clrMapOvr>
     <a:masterClrMapping/>
   </p:clrMapOvr>
-</p:sld>
-</file>
-
-<file path=ppt/slides/slide11.xml><?xml version="1.0" encoding="utf-8"?>
-<p:sld xmlns:a="http://schemas.openxmlformats.org/drawingml/2006/main" xmlns:r="http://schemas.openxmlformats.org/officeDocument/2006/relationships" xmlns:p="http://schemas.openxmlformats.org/presentationml/2006/main">
-  <p:cSld>
-    <p:spTree>
-      <p:nvGrpSpPr>
-        <p:cNvPr id="1" name=""/>
-        <p:cNvGrpSpPr/>
-        <p:nvPr/>
-      </p:nvGrpSpPr>
-      <p:grpSpPr>
-        <a:xfrm>
-          <a:off x="0" y="0"/>
-          <a:ext cx="0" cy="0"/>
-          <a:chOff x="0" y="0"/>
-          <a:chExt cx="0" cy="0"/>
-        </a:xfrm>
-      </p:grpSpPr>
-      <p:sp>
-        <p:nvSpPr>
-          <p:cNvPr id="2" name="Title 1"/>
-          <p:cNvSpPr>
-            <a:spLocks noGrp="1"/>
-          </p:cNvSpPr>
-          <p:nvPr>
-            <p:ph type="title"/>
-          </p:nvPr>
-        </p:nvSpPr>
-        <p:spPr/>
-        <p:txBody>
-          <a:bodyPr/>
-          <a:lstStyle/>
-          <a:p>
-            <a:r>
-              <a:rPr lang="en-GB" dirty="0" err="1" smtClean="0"/>
-              <a:t>Näherungssensoren</a:t>
-            </a:r>
-            <a:endParaRPr lang="en-GB" dirty="0"/>
-          </a:p>
-        </p:txBody>
-      </p:sp>
-      <p:sp>
-        <p:nvSpPr>
-          <p:cNvPr id="3" name="Content Placeholder 2"/>
-          <p:cNvSpPr>
-            <a:spLocks noGrp="1"/>
-          </p:cNvSpPr>
-          <p:nvPr>
-            <p:ph idx="1"/>
-          </p:nvPr>
-        </p:nvSpPr>
-        <p:spPr/>
-        <p:txBody>
-          <a:bodyPr>
-            <a:normAutofit fontScale="92500" lnSpcReduction="20000"/>
-          </a:bodyPr>
-          <a:lstStyle/>
-          <a:p>
-            <a:r>
-              <a:rPr lang="en-GB" dirty="0" err="1" smtClean="0"/>
-              <a:t>Optischer</a:t>
-            </a:r>
-            <a:r>
-              <a:rPr lang="en-GB" dirty="0" smtClean="0"/>
-              <a:t> </a:t>
-            </a:r>
-            <a:r>
-              <a:rPr lang="en-GB" dirty="0" err="1" smtClean="0"/>
-              <a:t>Näherungssensor</a:t>
-            </a:r>
-            <a:r>
-              <a:rPr lang="en-GB" dirty="0" smtClean="0"/>
-              <a:t>:</a:t>
-            </a:r>
-          </a:p>
-          <a:p>
-            <a:endParaRPr lang="en-GB" dirty="0"/>
-          </a:p>
-          <a:p>
-            <a:endParaRPr lang="en-GB" dirty="0" smtClean="0"/>
-          </a:p>
-          <a:p>
-            <a:endParaRPr lang="en-GB" dirty="0"/>
-          </a:p>
-          <a:p>
-            <a:endParaRPr lang="en-GB" dirty="0" smtClean="0"/>
-          </a:p>
-          <a:p>
-            <a:endParaRPr lang="en-GB" dirty="0" smtClean="0"/>
-          </a:p>
-          <a:p>
-            <a:r>
-              <a:rPr lang="en-GB" dirty="0" err="1" smtClean="0"/>
-              <a:t>Schranken</a:t>
-            </a:r>
-            <a:r>
-              <a:rPr lang="en-GB" dirty="0" smtClean="0"/>
-              <a:t>- und </a:t>
-            </a:r>
-            <a:r>
-              <a:rPr lang="en-GB" dirty="0" err="1" smtClean="0"/>
-              <a:t>Reflexionsprinzip</a:t>
-            </a:r>
-            <a:endParaRPr lang="en-GB" dirty="0"/>
-          </a:p>
-          <a:p>
-            <a:pPr lvl="1"/>
-            <a:r>
-              <a:rPr lang="en-GB" dirty="0" err="1" smtClean="0"/>
-              <a:t>Unterbrechung</a:t>
-            </a:r>
-            <a:r>
-              <a:rPr lang="en-GB" dirty="0" smtClean="0"/>
-              <a:t> </a:t>
-            </a:r>
-            <a:r>
-              <a:rPr lang="en-GB" dirty="0" err="1" smtClean="0"/>
-              <a:t>zw</a:t>
-            </a:r>
-            <a:r>
-              <a:rPr lang="en-GB" dirty="0" smtClean="0"/>
-              <a:t>. S und E </a:t>
-            </a:r>
-            <a:r>
-              <a:rPr lang="en-GB" dirty="0" err="1" smtClean="0"/>
-              <a:t>führt</a:t>
-            </a:r>
-            <a:r>
-              <a:rPr lang="en-GB" dirty="0" smtClean="0"/>
-              <a:t> </a:t>
-            </a:r>
-            <a:r>
-              <a:rPr lang="en-GB" dirty="0" err="1" smtClean="0"/>
-              <a:t>Handlung</a:t>
-            </a:r>
-            <a:endParaRPr lang="en-GB" dirty="0" smtClean="0"/>
-          </a:p>
-          <a:p>
-            <a:pPr marL="457200" lvl="1" indent="0">
-              <a:buNone/>
-            </a:pPr>
-            <a:endParaRPr lang="en-GB" dirty="0" smtClean="0"/>
-          </a:p>
-          <a:p>
-            <a:r>
-              <a:rPr lang="en-GB" dirty="0" err="1" smtClean="0"/>
-              <a:t>Einsatz</a:t>
-            </a:r>
-            <a:r>
-              <a:rPr lang="en-GB" dirty="0" smtClean="0"/>
-              <a:t> </a:t>
-            </a:r>
-            <a:r>
-              <a:rPr lang="en-GB" dirty="0" err="1" smtClean="0"/>
-              <a:t>im</a:t>
-            </a:r>
-            <a:r>
-              <a:rPr lang="en-GB" dirty="0" smtClean="0"/>
-              <a:t> </a:t>
-            </a:r>
-            <a:r>
-              <a:rPr lang="en-GB" dirty="0" err="1" smtClean="0"/>
-              <a:t>Alltag</a:t>
-            </a:r>
-            <a:r>
-              <a:rPr lang="en-GB" dirty="0" smtClean="0"/>
-              <a:t>: U-</a:t>
-            </a:r>
-            <a:r>
-              <a:rPr lang="en-GB" dirty="0" err="1" smtClean="0"/>
-              <a:t>Bahn</a:t>
-            </a:r>
-            <a:endParaRPr lang="en-GB" dirty="0" smtClean="0"/>
-          </a:p>
-          <a:p>
-            <a:pPr lvl="1"/>
-            <a:endParaRPr lang="en-GB" dirty="0" smtClean="0"/>
-          </a:p>
-          <a:p>
-            <a:endParaRPr lang="en-GB" dirty="0"/>
-          </a:p>
-          <a:p>
-            <a:endParaRPr lang="en-GB" dirty="0"/>
-          </a:p>
-        </p:txBody>
-      </p:sp>
-      <p:sp>
-        <p:nvSpPr>
-          <p:cNvPr id="4" name="Slide Number Placeholder 3"/>
-          <p:cNvSpPr>
-            <a:spLocks noGrp="1"/>
-          </p:cNvSpPr>
-          <p:nvPr>
-            <p:ph type="sldNum" sz="quarter" idx="12"/>
-          </p:nvPr>
-        </p:nvSpPr>
-        <p:spPr/>
-        <p:txBody>
-          <a:bodyPr/>
-          <a:lstStyle/>
-          <a:p>
-            <a:r>
-              <a:rPr lang="en-GB" sz="2000" dirty="0" smtClean="0"/>
-              <a:t>11</a:t>
-            </a:r>
-            <a:endParaRPr lang="en-GB" sz="2000" dirty="0"/>
-          </a:p>
-        </p:txBody>
-      </p:sp>
-      <p:pic>
-        <p:nvPicPr>
-          <p:cNvPr id="7170" name="Picture 2"/>
-          <p:cNvPicPr>
-            <a:picLocks noChangeAspect="1" noChangeArrowheads="1"/>
-          </p:cNvPicPr>
-          <p:nvPr/>
-        </p:nvPicPr>
-        <p:blipFill>
-          <a:blip r:embed="rId3">
-            <a:extLst>
-              <a:ext uri="{28A0092B-C50C-407E-A947-70E740481C1C}">
-                <a14:useLocalDpi xmlns:a14="http://schemas.microsoft.com/office/drawing/2010/main" val="0"/>
-              </a:ext>
-            </a:extLst>
-          </a:blip>
-          <a:srcRect/>
-          <a:stretch>
-            <a:fillRect/>
-          </a:stretch>
-        </p:blipFill>
-        <p:spPr bwMode="auto">
-          <a:xfrm>
-            <a:off x="2483768" y="2060848"/>
-            <a:ext cx="4057847" cy="2232248"/>
-          </a:xfrm>
-          <a:prstGeom prst="rect">
-            <a:avLst/>
-          </a:prstGeom>
-          <a:noFill/>
-          <a:ln>
-            <a:noFill/>
-          </a:ln>
-          <a:effectLst/>
-          <a:extLst>
-            <a:ext uri="{909E8E84-426E-40DD-AFC4-6F175D3DCCD1}">
-              <a14:hiddenFill xmlns:a14="http://schemas.microsoft.com/office/drawing/2010/main">
-                <a:solidFill>
-                  <a:schemeClr val="accent1"/>
-                </a:solidFill>
-              </a14:hiddenFill>
-            </a:ext>
-            <a:ext uri="{91240B29-F687-4F45-9708-019B960494DF}">
-              <a14:hiddenLine xmlns:a14="http://schemas.microsoft.com/office/drawing/2010/main" w="9525">
-                <a:solidFill>
-                  <a:schemeClr val="tx1"/>
-                </a:solidFill>
-                <a:miter lim="800000"/>
-                <a:headEnd/>
-                <a:tailEnd/>
-              </a14:hiddenLine>
-            </a:ext>
-            <a:ext uri="{AF507438-7753-43E0-B8FC-AC1667EBCBE1}">
-              <a14:hiddenEffects xmlns:a14="http://schemas.microsoft.com/office/drawing/2010/main">
-                <a:effectLst>
-                  <a:outerShdw dist="35921" dir="2700000" algn="ctr" rotWithShape="0">
-                    <a:schemeClr val="bg2"/>
-                  </a:outerShdw>
-                </a:effectLst>
-              </a14:hiddenEffects>
-            </a:ext>
-          </a:extLst>
-        </p:spPr>
-      </p:pic>
-    </p:spTree>
-    <p:extLst>
-      <p:ext uri="{BB962C8B-B14F-4D97-AF65-F5344CB8AC3E}">
-        <p14:creationId xmlns:p14="http://schemas.microsoft.com/office/powerpoint/2010/main" val="2696529370"/>
-      </p:ext>
-    </p:extLst>
-  </p:cSld>
-  <p:clrMapOvr>
-    <a:masterClrMapping/>
-  </p:clrMapOvr>
+  <p:timing>
+    <p:tnLst>
+      <p:par>
+        <p:cTn id="1" dur="indefinite" restart="never" nodeType="tmRoot"/>
+      </p:par>
+    </p:tnLst>
+  </p:timing>
 </p:sld>
 </file>
 
@@ -5845,33 +5859,116 @@
           <a:lstStyle/>
           <a:p>
             <a:r>
+              <a:rPr lang="en-GB" dirty="0" err="1" smtClean="0"/>
+              <a:t>Sicherheitssensorik</a:t>
+            </a:r>
+            <a:endParaRPr lang="en-GB" dirty="0"/>
+          </a:p>
+        </p:txBody>
+      </p:sp>
+      <p:sp>
+        <p:nvSpPr>
+          <p:cNvPr id="3" name="Content Placeholder 2"/>
+          <p:cNvSpPr>
+            <a:spLocks noGrp="1"/>
+          </p:cNvSpPr>
+          <p:nvPr>
+            <p:ph idx="1"/>
+          </p:nvPr>
+        </p:nvSpPr>
+        <p:spPr>
+          <a:xfrm>
+            <a:off x="457200" y="1600200"/>
+            <a:ext cx="8229600" cy="5121275"/>
+          </a:xfrm>
+        </p:spPr>
+        <p:txBody>
+          <a:bodyPr>
+            <a:normAutofit fontScale="62500" lnSpcReduction="20000"/>
+          </a:bodyPr>
+          <a:lstStyle/>
+          <a:p>
+            <a:pPr marL="0" indent="0">
+              <a:buNone/>
+            </a:pPr>
+            <a:endParaRPr lang="en-GB" dirty="0" smtClean="0"/>
+          </a:p>
+          <a:p>
+            <a:endParaRPr lang="en-GB" dirty="0"/>
+          </a:p>
+          <a:p>
+            <a:endParaRPr lang="en-GB" dirty="0" smtClean="0"/>
+          </a:p>
+          <a:p>
+            <a:endParaRPr lang="en-GB" dirty="0"/>
+          </a:p>
+          <a:p>
+            <a:endParaRPr lang="en-GB" dirty="0" smtClean="0"/>
+          </a:p>
+          <a:p>
+            <a:endParaRPr lang="en-GB" dirty="0" smtClean="0"/>
+          </a:p>
+          <a:p>
+            <a:endParaRPr lang="en-GB" dirty="0" smtClean="0"/>
+          </a:p>
+          <a:p>
+            <a:endParaRPr lang="en-GB" dirty="0"/>
+          </a:p>
+          <a:p>
+            <a:endParaRPr lang="en-GB" dirty="0" smtClean="0"/>
+          </a:p>
+          <a:p>
+            <a:endParaRPr lang="en-GB" dirty="0"/>
+          </a:p>
+          <a:p>
+            <a:endParaRPr lang="en-GB" dirty="0" smtClean="0"/>
+          </a:p>
+          <a:p>
+            <a:endParaRPr lang="en-GB" dirty="0" smtClean="0"/>
+          </a:p>
+          <a:p>
+            <a:pPr marL="0" indent="0">
+              <a:buNone/>
+            </a:pPr>
+            <a:endParaRPr lang="en-GB" dirty="0" smtClean="0"/>
+          </a:p>
+          <a:p>
+            <a:pPr marL="0" indent="0">
+              <a:buNone/>
+            </a:pPr>
+            <a:r>
+              <a:rPr lang="en-GB" dirty="0"/>
+              <a:t>	</a:t>
+            </a:r>
+            <a:r>
               <a:rPr lang="en-GB" dirty="0" smtClean="0"/>
-              <a:t>Augmented Reality</a:t>
-            </a:r>
-            <a:endParaRPr lang="en-GB" dirty="0"/>
-          </a:p>
-        </p:txBody>
-      </p:sp>
-      <p:sp>
-        <p:nvSpPr>
-          <p:cNvPr id="3" name="Content Placeholder 2"/>
-          <p:cNvSpPr>
-            <a:spLocks noGrp="1"/>
-          </p:cNvSpPr>
-          <p:nvPr>
-            <p:ph idx="1"/>
-          </p:nvPr>
-        </p:nvSpPr>
-        <p:spPr/>
-        <p:txBody>
-          <a:bodyPr>
-            <a:normAutofit/>
-          </a:bodyPr>
-          <a:lstStyle/>
-          <a:p>
+              <a:t>	</a:t>
+            </a:r>
+          </a:p>
+          <a:p>
+            <a:pPr marL="0" indent="0">
+              <a:buNone/>
+            </a:pPr>
+            <a:r>
+              <a:rPr lang="en-GB" dirty="0"/>
+              <a:t>	</a:t>
+            </a:r>
+            <a:r>
+              <a:rPr lang="en-GB" dirty="0" smtClean="0"/>
+              <a:t>	</a:t>
+            </a:r>
+          </a:p>
+          <a:p>
+            <a:pPr marL="0" indent="0">
+              <a:buNone/>
+            </a:pPr>
+            <a:r>
+              <a:rPr lang="en-GB" dirty="0" smtClean="0"/>
+              <a:t>         </a:t>
+            </a:r>
             <a:r>
               <a:rPr lang="en-GB" dirty="0" err="1" smtClean="0"/>
-              <a:t>Computergestützte</a:t>
+              <a:t>Optischer</a:t>
             </a:r>
             <a:r>
               <a:rPr lang="en-GB" dirty="0" smtClean="0"/>
@@ -5879,33 +5976,7 @@
             </a:r>
             <a:r>
               <a:rPr lang="en-GB" dirty="0" err="1" smtClean="0"/>
-              <a:t>Erweiterung</a:t>
-            </a:r>
-            <a:r>
-              <a:rPr lang="en-GB" dirty="0" smtClean="0"/>
-              <a:t> der </a:t>
-            </a:r>
-            <a:r>
-              <a:rPr lang="en-GB" dirty="0" err="1" smtClean="0"/>
-              <a:t>Realitätswahrnehmung</a:t>
-            </a:r>
-            <a:endParaRPr lang="en-GB" dirty="0" smtClean="0"/>
-          </a:p>
-          <a:p>
-            <a:endParaRPr lang="en-GB" dirty="0" smtClean="0"/>
-          </a:p>
-          <a:p>
-            <a:r>
-              <a:rPr lang="en-GB" dirty="0" err="1" smtClean="0"/>
-              <a:t>Verwendet</a:t>
-            </a:r>
-            <a:r>
-              <a:rPr lang="en-GB" dirty="0" smtClean="0"/>
-              <a:t>: </a:t>
-            </a:r>
-            <a:r>
-              <a:rPr lang="en-GB" dirty="0" err="1" smtClean="0"/>
-              <a:t>Visuelle</a:t>
+              <a:t>Abstandssensor</a:t>
             </a:r>
             <a:r>
               <a:rPr lang="en-GB" dirty="0" smtClean="0"/>
@@ -5913,15 +5984,27 @@
             </a:r>
             <a:r>
               <a:rPr lang="en-GB" dirty="0" err="1" smtClean="0"/>
-              <a:t>Darstellung</a:t>
+              <a:t>mittels</a:t>
             </a:r>
             <a:r>
               <a:rPr lang="en-GB" dirty="0" smtClean="0"/>
-              <a:t> von </a:t>
+              <a:t> </a:t>
             </a:r>
             <a:r>
               <a:rPr lang="en-GB" dirty="0" err="1" smtClean="0"/>
-              <a:t>Informationen</a:t>
+              <a:t>Schranken</a:t>
+            </a:r>
+            <a:r>
+              <a:rPr lang="en-GB" dirty="0" smtClean="0"/>
+              <a:t>- </a:t>
+            </a:r>
+            <a:r>
+              <a:rPr lang="en-GB" dirty="0" smtClean="0"/>
+              <a:t>und </a:t>
+            </a:r>
+            <a:r>
+              <a:rPr lang="en-GB" dirty="0" err="1" smtClean="0"/>
+              <a:t>Reflexionsprinzip</a:t>
             </a:r>
             <a:endParaRPr lang="en-GB" dirty="0" smtClean="0"/>
           </a:p>
@@ -5932,40 +6015,6 @@
             <a:endParaRPr lang="en-GB" dirty="0" smtClean="0"/>
           </a:p>
           <a:p>
-            <a:r>
-              <a:rPr lang="en-GB" dirty="0" err="1" smtClean="0"/>
-              <a:t>Beispielbringung</a:t>
-            </a:r>
-            <a:r>
-              <a:rPr lang="en-GB" dirty="0" smtClean="0"/>
-              <a:t>:</a:t>
-            </a:r>
-          </a:p>
-          <a:p>
-            <a:pPr lvl="1"/>
-            <a:r>
-              <a:rPr lang="en-GB" dirty="0" smtClean="0"/>
-              <a:t>Auf den </a:t>
-            </a:r>
-            <a:r>
-              <a:rPr lang="en-GB" dirty="0" err="1" smtClean="0"/>
-              <a:t>nächsten</a:t>
-            </a:r>
-            <a:r>
-              <a:rPr lang="en-GB" dirty="0" smtClean="0"/>
-              <a:t> </a:t>
-            </a:r>
-            <a:r>
-              <a:rPr lang="en-GB" dirty="0" err="1" smtClean="0"/>
-              <a:t>Folien</a:t>
-            </a:r>
-            <a:endParaRPr lang="en-GB" dirty="0" smtClean="0"/>
-          </a:p>
-          <a:p>
-            <a:pPr lvl="1"/>
-            <a:endParaRPr lang="en-GB" dirty="0" smtClean="0"/>
-          </a:p>
-          <a:p>
             <a:endParaRPr lang="en-GB" dirty="0"/>
           </a:p>
           <a:p>
@@ -5990,22 +6039,59 @@
           <a:p>
             <a:r>
               <a:rPr lang="en-GB" sz="2000" dirty="0" smtClean="0"/>
-              <a:t>12</a:t>
+              <a:t>11</a:t>
             </a:r>
             <a:endParaRPr lang="en-GB" sz="2000" dirty="0"/>
           </a:p>
         </p:txBody>
       </p:sp>
+      <p:pic>
+        <p:nvPicPr>
+          <p:cNvPr id="5" name="Picture 4"/>
+          <p:cNvPicPr>
+            <a:picLocks noChangeAspect="1"/>
+          </p:cNvPicPr>
+          <p:nvPr/>
+        </p:nvPicPr>
+        <p:blipFill>
+          <a:blip r:embed="rId3">
+            <a:extLst>
+              <a:ext uri="{28A0092B-C50C-407E-A947-70E740481C1C}">
+                <a14:useLocalDpi xmlns:a14="http://schemas.microsoft.com/office/drawing/2010/main" val="0"/>
+              </a:ext>
+            </a:extLst>
+          </a:blip>
+          <a:stretch>
+            <a:fillRect/>
+          </a:stretch>
+        </p:blipFill>
+        <p:spPr>
+          <a:xfrm>
+            <a:off x="1403648" y="1231600"/>
+            <a:ext cx="5544616" cy="4756856"/>
+          </a:xfrm>
+          <a:prstGeom prst="rect">
+            <a:avLst/>
+          </a:prstGeom>
+        </p:spPr>
+      </p:pic>
     </p:spTree>
     <p:extLst>
       <p:ext uri="{BB962C8B-B14F-4D97-AF65-F5344CB8AC3E}">
-        <p14:creationId xmlns:p14="http://schemas.microsoft.com/office/powerpoint/2010/main" val="3913830432"/>
+        <p14:creationId xmlns:p14="http://schemas.microsoft.com/office/powerpoint/2010/main" val="2696529370"/>
       </p:ext>
     </p:extLst>
   </p:cSld>
   <p:clrMapOvr>
     <a:masterClrMapping/>
   </p:clrMapOvr>
+  <p:timing>
+    <p:tnLst>
+      <p:par>
+        <p:cTn id="1" dur="indefinite" restart="never" nodeType="tmRoot"/>
+      </p:par>
+    </p:tnLst>
+  </p:timing>
 </p:sld>
 </file>
 
@@ -6026,6 +6112,267 @@
           <a:chExt cx="0" cy="0"/>
         </a:xfrm>
       </p:grpSpPr>
+      <p:pic>
+        <p:nvPicPr>
+          <p:cNvPr id="5" name="Content Placeholder 4"/>
+          <p:cNvPicPr>
+            <a:picLocks noGrp="1" noChangeAspect="1"/>
+          </p:cNvPicPr>
+          <p:nvPr>
+            <p:ph idx="1"/>
+          </p:nvPr>
+        </p:nvPicPr>
+        <p:blipFill>
+          <a:blip r:embed="rId2">
+            <a:extLst>
+              <a:ext uri="{28A0092B-C50C-407E-A947-70E740481C1C}">
+                <a14:useLocalDpi xmlns:a14="http://schemas.microsoft.com/office/drawing/2010/main" val="0"/>
+              </a:ext>
+            </a:extLst>
+          </a:blip>
+          <a:stretch>
+            <a:fillRect/>
+          </a:stretch>
+        </p:blipFill>
+        <p:spPr>
+          <a:xfrm>
+            <a:off x="1043608" y="692696"/>
+            <a:ext cx="6984776" cy="4922604"/>
+          </a:xfrm>
+        </p:spPr>
+      </p:pic>
+      <p:sp>
+        <p:nvSpPr>
+          <p:cNvPr id="4" name="Slide Number Placeholder 3"/>
+          <p:cNvSpPr>
+            <a:spLocks noGrp="1"/>
+          </p:cNvSpPr>
+          <p:nvPr>
+            <p:ph type="sldNum" sz="quarter" idx="12"/>
+          </p:nvPr>
+        </p:nvSpPr>
+        <p:spPr/>
+        <p:txBody>
+          <a:bodyPr/>
+          <a:lstStyle/>
+          <a:p>
+            <a:r>
+              <a:rPr lang="en-GB" sz="2000" dirty="0" smtClean="0"/>
+              <a:t>12</a:t>
+            </a:r>
+            <a:endParaRPr lang="en-GB" dirty="0"/>
+          </a:p>
+        </p:txBody>
+      </p:sp>
+    </p:spTree>
+    <p:extLst>
+      <p:ext uri="{BB962C8B-B14F-4D97-AF65-F5344CB8AC3E}">
+        <p14:creationId xmlns:p14="http://schemas.microsoft.com/office/powerpoint/2010/main" val="864950822"/>
+      </p:ext>
+    </p:extLst>
+  </p:cSld>
+  <p:clrMapOvr>
+    <a:masterClrMapping/>
+  </p:clrMapOvr>
+  <p:timing>
+    <p:tnLst>
+      <p:par>
+        <p:cTn id="1" dur="indefinite" restart="never" nodeType="tmRoot"/>
+      </p:par>
+    </p:tnLst>
+  </p:timing>
+</p:sld>
+</file>
+
+<file path=ppt/slides/slide14.xml><?xml version="1.0" encoding="utf-8"?>
+<p:sld xmlns:a="http://schemas.openxmlformats.org/drawingml/2006/main" xmlns:r="http://schemas.openxmlformats.org/officeDocument/2006/relationships" xmlns:p="http://schemas.openxmlformats.org/presentationml/2006/main">
+  <p:cSld>
+    <p:spTree>
+      <p:nvGrpSpPr>
+        <p:cNvPr id="1" name=""/>
+        <p:cNvGrpSpPr/>
+        <p:nvPr/>
+      </p:nvGrpSpPr>
+      <p:grpSpPr>
+        <a:xfrm>
+          <a:off x="0" y="0"/>
+          <a:ext cx="0" cy="0"/>
+          <a:chOff x="0" y="0"/>
+          <a:chExt cx="0" cy="0"/>
+        </a:xfrm>
+      </p:grpSpPr>
+      <p:sp>
+        <p:nvSpPr>
+          <p:cNvPr id="2" name="Title 1"/>
+          <p:cNvSpPr>
+            <a:spLocks noGrp="1"/>
+          </p:cNvSpPr>
+          <p:nvPr>
+            <p:ph type="title"/>
+          </p:nvPr>
+        </p:nvSpPr>
+        <p:spPr/>
+        <p:txBody>
+          <a:bodyPr/>
+          <a:lstStyle/>
+          <a:p>
+            <a:r>
+              <a:rPr lang="en-GB" dirty="0" err="1" smtClean="0"/>
+              <a:t>Verwendung</a:t>
+            </a:r>
+            <a:r>
+              <a:rPr lang="en-GB" dirty="0" smtClean="0"/>
+              <a:t> der </a:t>
+            </a:r>
+            <a:r>
+              <a:rPr lang="en-GB" dirty="0" err="1" smtClean="0"/>
+              <a:t>Sensoren</a:t>
+            </a:r>
+            <a:endParaRPr lang="en-GB" dirty="0"/>
+          </a:p>
+        </p:txBody>
+      </p:sp>
+      <p:sp>
+        <p:nvSpPr>
+          <p:cNvPr id="3" name="Content Placeholder 2"/>
+          <p:cNvSpPr>
+            <a:spLocks noGrp="1"/>
+          </p:cNvSpPr>
+          <p:nvPr>
+            <p:ph idx="1"/>
+          </p:nvPr>
+        </p:nvSpPr>
+        <p:spPr/>
+        <p:txBody>
+          <a:bodyPr/>
+          <a:lstStyle/>
+          <a:p>
+            <a:r>
+              <a:rPr lang="en-GB" dirty="0" smtClean="0"/>
+              <a:t>Interne </a:t>
+            </a:r>
+            <a:r>
+              <a:rPr lang="en-GB" dirty="0" err="1" smtClean="0"/>
+              <a:t>Sensorik</a:t>
+            </a:r>
+            <a:r>
+              <a:rPr lang="en-GB" dirty="0" smtClean="0"/>
+              <a:t>:</a:t>
+            </a:r>
+          </a:p>
+          <a:p>
+            <a:pPr lvl="1"/>
+            <a:r>
+              <a:rPr lang="en-GB" dirty="0" smtClean="0"/>
+              <a:t>Potentiometer - </a:t>
+            </a:r>
+            <a:r>
+              <a:rPr lang="en-GB" dirty="0" err="1" smtClean="0"/>
+              <a:t>Positionssensoren</a:t>
+            </a:r>
+            <a:endParaRPr lang="en-GB" dirty="0" smtClean="0"/>
+          </a:p>
+          <a:p>
+            <a:pPr lvl="1"/>
+            <a:r>
+              <a:rPr lang="en-GB" dirty="0" err="1" smtClean="0"/>
+              <a:t>Infrarotsensor</a:t>
+            </a:r>
+            <a:r>
+              <a:rPr lang="en-GB" dirty="0" smtClean="0"/>
+              <a:t> - </a:t>
+            </a:r>
+            <a:r>
+              <a:rPr lang="en-GB" dirty="0" err="1" smtClean="0"/>
+              <a:t>Abstandssensor</a:t>
+            </a:r>
+            <a:endParaRPr lang="en-GB" dirty="0" smtClean="0"/>
+          </a:p>
+          <a:p>
+            <a:r>
+              <a:rPr lang="en-GB" dirty="0" err="1" smtClean="0"/>
+              <a:t>Externe</a:t>
+            </a:r>
+            <a:r>
+              <a:rPr lang="en-GB" dirty="0" smtClean="0"/>
+              <a:t> </a:t>
+            </a:r>
+            <a:r>
+              <a:rPr lang="en-GB" dirty="0" err="1" smtClean="0"/>
+              <a:t>Sensorik</a:t>
+            </a:r>
+            <a:r>
+              <a:rPr lang="en-GB" dirty="0" smtClean="0"/>
+              <a:t>:</a:t>
+            </a:r>
+          </a:p>
+          <a:p>
+            <a:pPr lvl="1"/>
+            <a:r>
+              <a:rPr lang="en-GB" dirty="0" err="1" smtClean="0"/>
+              <a:t>Lichtschranke</a:t>
+            </a:r>
+            <a:r>
+              <a:rPr lang="en-GB" dirty="0" smtClean="0"/>
+              <a:t> - </a:t>
+            </a:r>
+            <a:r>
+              <a:rPr lang="en-GB" dirty="0" err="1" smtClean="0"/>
+              <a:t>Sicherheitssensorik</a:t>
+            </a:r>
+            <a:endParaRPr lang="en-GB" dirty="0"/>
+          </a:p>
+          <a:p>
+            <a:r>
+              <a:rPr lang="en-GB" dirty="0" err="1" smtClean="0"/>
+              <a:t>Sensorik</a:t>
+            </a:r>
+            <a:r>
+              <a:rPr lang="en-GB" dirty="0" smtClean="0"/>
+              <a:t> Minimum:</a:t>
+            </a:r>
+            <a:endParaRPr lang="en-GB" dirty="0"/>
+          </a:p>
+          <a:p>
+            <a:pPr lvl="1"/>
+            <a:r>
+              <a:rPr lang="en-GB" dirty="0" err="1" smtClean="0"/>
+              <a:t>Verwendung</a:t>
+            </a:r>
+            <a:r>
+              <a:rPr lang="en-GB" dirty="0" smtClean="0"/>
+              <a:t> von </a:t>
+            </a:r>
+            <a:r>
+              <a:rPr lang="en-GB" dirty="0" err="1" smtClean="0"/>
+              <a:t>Servomotoren</a:t>
+            </a:r>
+            <a:endParaRPr lang="en-GB" dirty="0"/>
+          </a:p>
+          <a:p>
+            <a:pPr marL="457200" lvl="1" indent="0">
+              <a:buNone/>
+            </a:pPr>
+            <a:endParaRPr lang="en-GB" dirty="0"/>
+          </a:p>
+          <a:p>
+            <a:pPr marL="457200" lvl="1" indent="0">
+              <a:buNone/>
+            </a:pPr>
+            <a:endParaRPr lang="en-GB" dirty="0" smtClean="0"/>
+          </a:p>
+          <a:p>
+            <a:pPr lvl="1"/>
+            <a:endParaRPr lang="en-GB" dirty="0" smtClean="0"/>
+          </a:p>
+          <a:p>
+            <a:endParaRPr lang="en-GB" dirty="0"/>
+          </a:p>
+          <a:p>
+            <a:endParaRPr lang="en-GB" dirty="0"/>
+          </a:p>
+        </p:txBody>
+      </p:sp>
       <p:sp>
         <p:nvSpPr>
           <p:cNvPr id="4" name="Slide Number Placeholder 3"/>
@@ -6044,6 +6391,270 @@
             <a:r>
               <a:rPr lang="en-GB" sz="2000" dirty="0" smtClean="0"/>
               <a:t>13</a:t>
+            </a:r>
+            <a:endParaRPr lang="en-GB" dirty="0"/>
+          </a:p>
+        </p:txBody>
+      </p:sp>
+    </p:spTree>
+    <p:extLst>
+      <p:ext uri="{BB962C8B-B14F-4D97-AF65-F5344CB8AC3E}">
+        <p14:creationId xmlns:p14="http://schemas.microsoft.com/office/powerpoint/2010/main" val="3736221008"/>
+      </p:ext>
+    </p:extLst>
+  </p:cSld>
+  <p:clrMapOvr>
+    <a:masterClrMapping/>
+  </p:clrMapOvr>
+  <p:timing>
+    <p:tnLst>
+      <p:par>
+        <p:cTn id="1" dur="indefinite" restart="never" nodeType="tmRoot"/>
+      </p:par>
+    </p:tnLst>
+  </p:timing>
+</p:sld>
+</file>
+
+<file path=ppt/slides/slide15.xml><?xml version="1.0" encoding="utf-8"?>
+<p:sld xmlns:a="http://schemas.openxmlformats.org/drawingml/2006/main" xmlns:r="http://schemas.openxmlformats.org/officeDocument/2006/relationships" xmlns:p="http://schemas.openxmlformats.org/presentationml/2006/main">
+  <p:cSld>
+    <p:spTree>
+      <p:nvGrpSpPr>
+        <p:cNvPr id="1" name=""/>
+        <p:cNvGrpSpPr/>
+        <p:nvPr/>
+      </p:nvGrpSpPr>
+      <p:grpSpPr>
+        <a:xfrm>
+          <a:off x="0" y="0"/>
+          <a:ext cx="0" cy="0"/>
+          <a:chOff x="0" y="0"/>
+          <a:chExt cx="0" cy="0"/>
+        </a:xfrm>
+      </p:grpSpPr>
+      <p:sp>
+        <p:nvSpPr>
+          <p:cNvPr id="2" name="Title 1"/>
+          <p:cNvSpPr>
+            <a:spLocks noGrp="1"/>
+          </p:cNvSpPr>
+          <p:nvPr>
+            <p:ph type="title"/>
+          </p:nvPr>
+        </p:nvSpPr>
+        <p:spPr/>
+        <p:txBody>
+          <a:bodyPr/>
+          <a:lstStyle/>
+          <a:p>
+            <a:r>
+              <a:rPr lang="en-GB" dirty="0" smtClean="0"/>
+              <a:t>Augmented Reality</a:t>
+            </a:r>
+            <a:endParaRPr lang="en-GB" dirty="0"/>
+          </a:p>
+        </p:txBody>
+      </p:sp>
+      <p:sp>
+        <p:nvSpPr>
+          <p:cNvPr id="3" name="Content Placeholder 2"/>
+          <p:cNvSpPr>
+            <a:spLocks noGrp="1"/>
+          </p:cNvSpPr>
+          <p:nvPr>
+            <p:ph idx="1"/>
+          </p:nvPr>
+        </p:nvSpPr>
+        <p:spPr/>
+        <p:txBody>
+          <a:bodyPr>
+            <a:normAutofit/>
+          </a:bodyPr>
+          <a:lstStyle/>
+          <a:p>
+            <a:r>
+              <a:rPr lang="en-GB" dirty="0" err="1" smtClean="0"/>
+              <a:t>Computergestützte</a:t>
+            </a:r>
+            <a:r>
+              <a:rPr lang="en-GB" dirty="0" smtClean="0"/>
+              <a:t> </a:t>
+            </a:r>
+            <a:r>
+              <a:rPr lang="en-GB" dirty="0" err="1" smtClean="0"/>
+              <a:t>Erweiterung</a:t>
+            </a:r>
+            <a:r>
+              <a:rPr lang="en-GB" dirty="0" smtClean="0"/>
+              <a:t> der </a:t>
+            </a:r>
+            <a:r>
+              <a:rPr lang="en-GB" dirty="0" err="1" smtClean="0"/>
+              <a:t>Realitätswahrnehmung</a:t>
+            </a:r>
+            <a:endParaRPr lang="en-GB" dirty="0" smtClean="0"/>
+          </a:p>
+          <a:p>
+            <a:endParaRPr lang="en-GB" dirty="0" smtClean="0"/>
+          </a:p>
+          <a:p>
+            <a:r>
+              <a:rPr lang="en-GB" dirty="0" err="1" smtClean="0"/>
+              <a:t>Verwendet</a:t>
+            </a:r>
+            <a:r>
+              <a:rPr lang="en-GB" dirty="0" smtClean="0"/>
+              <a:t>: </a:t>
+            </a:r>
+            <a:r>
+              <a:rPr lang="en-GB" dirty="0" err="1" smtClean="0"/>
+              <a:t>Visuelle</a:t>
+            </a:r>
+            <a:r>
+              <a:rPr lang="en-GB" dirty="0" smtClean="0"/>
+              <a:t> </a:t>
+            </a:r>
+            <a:r>
+              <a:rPr lang="en-GB" dirty="0" err="1" smtClean="0"/>
+              <a:t>Darstellung</a:t>
+            </a:r>
+            <a:r>
+              <a:rPr lang="en-GB" dirty="0" smtClean="0"/>
+              <a:t> von </a:t>
+            </a:r>
+            <a:r>
+              <a:rPr lang="en-GB" dirty="0" err="1" smtClean="0"/>
+              <a:t>Informationen</a:t>
+            </a:r>
+            <a:endParaRPr lang="en-GB" dirty="0" smtClean="0"/>
+          </a:p>
+          <a:p>
+            <a:pPr marL="457200" lvl="1" indent="0">
+              <a:buNone/>
+            </a:pPr>
+            <a:endParaRPr lang="en-GB" dirty="0" smtClean="0"/>
+          </a:p>
+          <a:p>
+            <a:r>
+              <a:rPr lang="en-GB" dirty="0" err="1" smtClean="0"/>
+              <a:t>Beispielbringung</a:t>
+            </a:r>
+            <a:r>
+              <a:rPr lang="en-GB" dirty="0" smtClean="0"/>
+              <a:t>:</a:t>
+            </a:r>
+          </a:p>
+          <a:p>
+            <a:pPr lvl="1"/>
+            <a:r>
+              <a:rPr lang="en-GB" dirty="0" smtClean="0"/>
+              <a:t>Auf den </a:t>
+            </a:r>
+            <a:r>
+              <a:rPr lang="en-GB" dirty="0" err="1" smtClean="0"/>
+              <a:t>nächsten</a:t>
+            </a:r>
+            <a:r>
+              <a:rPr lang="en-GB" dirty="0" smtClean="0"/>
+              <a:t> </a:t>
+            </a:r>
+            <a:r>
+              <a:rPr lang="en-GB" dirty="0" err="1" smtClean="0"/>
+              <a:t>Folien</a:t>
+            </a:r>
+            <a:endParaRPr lang="en-GB" dirty="0" smtClean="0"/>
+          </a:p>
+          <a:p>
+            <a:pPr lvl="1"/>
+            <a:endParaRPr lang="en-GB" dirty="0" smtClean="0"/>
+          </a:p>
+          <a:p>
+            <a:endParaRPr lang="en-GB" dirty="0"/>
+          </a:p>
+          <a:p>
+            <a:endParaRPr lang="en-GB" dirty="0"/>
+          </a:p>
+        </p:txBody>
+      </p:sp>
+      <p:sp>
+        <p:nvSpPr>
+          <p:cNvPr id="4" name="Slide Number Placeholder 3"/>
+          <p:cNvSpPr>
+            <a:spLocks noGrp="1"/>
+          </p:cNvSpPr>
+          <p:nvPr>
+            <p:ph type="sldNum" sz="quarter" idx="12"/>
+          </p:nvPr>
+        </p:nvSpPr>
+        <p:spPr/>
+        <p:txBody>
+          <a:bodyPr/>
+          <a:lstStyle/>
+          <a:p>
+            <a:r>
+              <a:rPr lang="en-GB" sz="2000" dirty="0" smtClean="0"/>
+              <a:t>14</a:t>
+            </a:r>
+            <a:endParaRPr lang="en-GB" sz="2000" dirty="0"/>
+          </a:p>
+        </p:txBody>
+      </p:sp>
+    </p:spTree>
+    <p:extLst>
+      <p:ext uri="{BB962C8B-B14F-4D97-AF65-F5344CB8AC3E}">
+        <p14:creationId xmlns:p14="http://schemas.microsoft.com/office/powerpoint/2010/main" val="3913830432"/>
+      </p:ext>
+    </p:extLst>
+  </p:cSld>
+  <p:clrMapOvr>
+    <a:masterClrMapping/>
+  </p:clrMapOvr>
+  <p:timing>
+    <p:tnLst>
+      <p:par>
+        <p:cTn id="1" dur="indefinite" restart="never" nodeType="tmRoot"/>
+      </p:par>
+    </p:tnLst>
+  </p:timing>
+</p:sld>
+</file>
+
+<file path=ppt/slides/slide16.xml><?xml version="1.0" encoding="utf-8"?>
+<p:sld xmlns:a="http://schemas.openxmlformats.org/drawingml/2006/main" xmlns:r="http://schemas.openxmlformats.org/officeDocument/2006/relationships" xmlns:p="http://schemas.openxmlformats.org/presentationml/2006/main">
+  <p:cSld>
+    <p:spTree>
+      <p:nvGrpSpPr>
+        <p:cNvPr id="1" name=""/>
+        <p:cNvGrpSpPr/>
+        <p:nvPr/>
+      </p:nvGrpSpPr>
+      <p:grpSpPr>
+        <a:xfrm>
+          <a:off x="0" y="0"/>
+          <a:ext cx="0" cy="0"/>
+          <a:chOff x="0" y="0"/>
+          <a:chExt cx="0" cy="0"/>
+        </a:xfrm>
+      </p:grpSpPr>
+      <p:sp>
+        <p:nvSpPr>
+          <p:cNvPr id="4" name="Slide Number Placeholder 3"/>
+          <p:cNvSpPr>
+            <a:spLocks noGrp="1"/>
+          </p:cNvSpPr>
+          <p:nvPr>
+            <p:ph type="sldNum" sz="quarter" idx="12"/>
+          </p:nvPr>
+        </p:nvSpPr>
+        <p:spPr/>
+        <p:txBody>
+          <a:bodyPr/>
+          <a:lstStyle/>
+          <a:p>
+            <a:r>
+              <a:rPr lang="en-GB" sz="2000" dirty="0" smtClean="0"/>
+              <a:t>15</a:t>
             </a:r>
             <a:endParaRPr lang="en-GB" sz="2000" dirty="0"/>
           </a:p>
@@ -6185,10 +6796,17 @@
   <p:clrMapOvr>
     <a:masterClrMapping/>
   </p:clrMapOvr>
+  <p:timing>
+    <p:tnLst>
+      <p:par>
+        <p:cTn id="1" dur="indefinite" restart="never" nodeType="tmRoot"/>
+      </p:par>
+    </p:tnLst>
+  </p:timing>
 </p:sld>
 </file>
 
-<file path=ppt/slides/slide14.xml><?xml version="1.0" encoding="utf-8"?>
+<file path=ppt/slides/slide17.xml><?xml version="1.0" encoding="utf-8"?>
 <p:sld xmlns:a="http://schemas.openxmlformats.org/drawingml/2006/main" xmlns:r="http://schemas.openxmlformats.org/officeDocument/2006/relationships" xmlns:p="http://schemas.openxmlformats.org/presentationml/2006/main">
   <p:cSld>
     <p:spTree>
@@ -6222,7 +6840,7 @@
           <a:p>
             <a:r>
               <a:rPr lang="en-GB" sz="2000" dirty="0" smtClean="0"/>
-              <a:t>14</a:t>
+              <a:t>16</a:t>
             </a:r>
             <a:endParaRPr lang="en-GB" sz="2000" dirty="0"/>
           </a:p>
@@ -6354,10 +6972,17 @@
   <p:clrMapOvr>
     <a:masterClrMapping/>
   </p:clrMapOvr>
+  <p:timing>
+    <p:tnLst>
+      <p:par>
+        <p:cTn id="1" dur="indefinite" restart="never" nodeType="tmRoot"/>
+      </p:par>
+    </p:tnLst>
+  </p:timing>
 </p:sld>
 </file>
 
-<file path=ppt/slides/slide15.xml><?xml version="1.0" encoding="utf-8"?>
+<file path=ppt/slides/slide18.xml><?xml version="1.0" encoding="utf-8"?>
 <p:sld xmlns:a="http://schemas.openxmlformats.org/drawingml/2006/main" xmlns:r="http://schemas.openxmlformats.org/officeDocument/2006/relationships" xmlns:p="http://schemas.openxmlformats.org/presentationml/2006/main">
   <p:cSld>
     <p:spTree>
@@ -6391,7 +7016,7 @@
           <a:p>
             <a:r>
               <a:rPr lang="en-GB" sz="2000" dirty="0" smtClean="0"/>
-              <a:t>15</a:t>
+              <a:t>17</a:t>
             </a:r>
             <a:endParaRPr lang="en-GB" sz="2000" dirty="0"/>
           </a:p>
@@ -6579,10 +7204,17 @@
   <p:clrMapOvr>
     <a:masterClrMapping/>
   </p:clrMapOvr>
+  <p:timing>
+    <p:tnLst>
+      <p:par>
+        <p:cTn id="1" dur="indefinite" restart="never" nodeType="tmRoot"/>
+      </p:par>
+    </p:tnLst>
+  </p:timing>
 </p:sld>
 </file>
 
-<file path=ppt/slides/slide16.xml><?xml version="1.0" encoding="utf-8"?>
+<file path=ppt/slides/slide19.xml><?xml version="1.0" encoding="utf-8"?>
 <p:sld xmlns:a="http://schemas.openxmlformats.org/drawingml/2006/main" xmlns:r="http://schemas.openxmlformats.org/officeDocument/2006/relationships" xmlns:p="http://schemas.openxmlformats.org/presentationml/2006/main">
   <p:cSld>
     <p:spTree>
@@ -6739,7 +7371,7 @@
           <a:p>
             <a:r>
               <a:rPr lang="en-GB" sz="2000" dirty="0" smtClean="0"/>
-              <a:t>16</a:t>
+              <a:t>18</a:t>
             </a:r>
             <a:endParaRPr lang="en-GB" sz="2000" dirty="0"/>
           </a:p>
@@ -6755,10 +7387,17 @@
   <p:clrMapOvr>
     <a:masterClrMapping/>
   </p:clrMapOvr>
+  <p:timing>
+    <p:tnLst>
+      <p:par>
+        <p:cTn id="1" dur="indefinite" restart="never" nodeType="tmRoot"/>
+      </p:par>
+    </p:tnLst>
+  </p:timing>
 </p:sld>
 </file>
 
-<file path=ppt/slides/slide17.xml><?xml version="1.0" encoding="utf-8"?>
+<file path=ppt/slides/slide2.xml><?xml version="1.0" encoding="utf-8"?>
 <p:sld xmlns:a="http://schemas.openxmlformats.org/drawingml/2006/main" xmlns:r="http://schemas.openxmlformats.org/officeDocument/2006/relationships" xmlns:p="http://schemas.openxmlformats.org/presentationml/2006/main">
   <p:cSld>
     <p:spTree>
@@ -6777,6 +7416,76 @@
       </p:grpSpPr>
       <p:sp>
         <p:nvSpPr>
+          <p:cNvPr id="2" name="Title 1"/>
+          <p:cNvSpPr>
+            <a:spLocks noGrp="1"/>
+          </p:cNvSpPr>
+          <p:nvPr>
+            <p:ph type="title"/>
+          </p:nvPr>
+        </p:nvSpPr>
+        <p:spPr/>
+        <p:txBody>
+          <a:bodyPr/>
+          <a:lstStyle/>
+          <a:p>
+            <a:r>
+              <a:rPr lang="en-GB" dirty="0" err="1" smtClean="0"/>
+              <a:t>Sensoren</a:t>
+            </a:r>
+            <a:r>
+              <a:rPr lang="en-GB" dirty="0" smtClean="0"/>
+              <a:t> an </a:t>
+            </a:r>
+            <a:r>
+              <a:rPr lang="en-GB" dirty="0" err="1" smtClean="0"/>
+              <a:t>autonomen</a:t>
+            </a:r>
+            <a:r>
+              <a:rPr lang="en-GB" dirty="0" smtClean="0"/>
+              <a:t> </a:t>
+            </a:r>
+            <a:r>
+              <a:rPr lang="en-GB" dirty="0" err="1" smtClean="0"/>
+              <a:t>Robotern</a:t>
+            </a:r>
+            <a:endParaRPr lang="en-GB" dirty="0"/>
+          </a:p>
+        </p:txBody>
+      </p:sp>
+      <p:sp>
+        <p:nvSpPr>
+          <p:cNvPr id="3" name="Content Placeholder 2"/>
+          <p:cNvSpPr>
+            <a:spLocks noGrp="1"/>
+          </p:cNvSpPr>
+          <p:nvPr>
+            <p:ph idx="1"/>
+          </p:nvPr>
+        </p:nvSpPr>
+        <p:spPr>
+          <a:xfrm>
+            <a:off x="457200" y="2132856"/>
+            <a:ext cx="8229600" cy="3993307"/>
+          </a:xfrm>
+        </p:spPr>
+        <p:txBody>
+          <a:bodyPr/>
+          <a:lstStyle/>
+          <a:p>
+            <a:pPr marL="0" indent="0">
+              <a:buNone/>
+            </a:pPr>
+            <a:r>
+              <a:rPr lang="de-DE" i="1" dirty="0" smtClean="0"/>
+              <a:t>’Ein autonomer mobiler Roboter ist eine Maschine, die sich in einer natürlichen Umgebung aus eigener Kraft und ohne Hilfestellung von außen bewegen und dabei ein ihr gestelltes Ziel erreichen kann. [...] Dabei erkennt sie die Umwelt, sofern dies notwendig ist, über eigene Sensoren.’ (P. Hoppen)</a:t>
+            </a:r>
+            <a:endParaRPr lang="en-GB" i="1" dirty="0"/>
+          </a:p>
+        </p:txBody>
+      </p:sp>
+      <p:sp>
+        <p:nvSpPr>
           <p:cNvPr id="4" name="Slide Number Placeholder 3"/>
           <p:cNvSpPr>
             <a:spLocks noGrp="1"/>
@@ -6792,8 +7501,68 @@
           <a:p>
             <a:fld id="{169B6969-B37F-4A17-ACF5-55252B4AE136}" type="slidenum">
               <a:rPr lang="en-GB" sz="2000" smtClean="0"/>
-              <a:t>17</a:t>
+              <a:t>2</a:t>
             </a:fld>
+            <a:endParaRPr lang="en-GB" sz="2000" dirty="0"/>
+          </a:p>
+        </p:txBody>
+      </p:sp>
+    </p:spTree>
+    <p:extLst>
+      <p:ext uri="{BB962C8B-B14F-4D97-AF65-F5344CB8AC3E}">
+        <p14:creationId xmlns:p14="http://schemas.microsoft.com/office/powerpoint/2010/main" val="3680604814"/>
+      </p:ext>
+    </p:extLst>
+  </p:cSld>
+  <p:clrMapOvr>
+    <a:masterClrMapping/>
+  </p:clrMapOvr>
+  <p:timing>
+    <p:tnLst>
+      <p:par>
+        <p:cTn id="1" dur="indefinite" restart="never" nodeType="tmRoot"/>
+      </p:par>
+    </p:tnLst>
+  </p:timing>
+</p:sld>
+</file>
+
+<file path=ppt/slides/slide20.xml><?xml version="1.0" encoding="utf-8"?>
+<p:sld xmlns:a="http://schemas.openxmlformats.org/drawingml/2006/main" xmlns:r="http://schemas.openxmlformats.org/officeDocument/2006/relationships" xmlns:p="http://schemas.openxmlformats.org/presentationml/2006/main">
+  <p:cSld>
+    <p:spTree>
+      <p:nvGrpSpPr>
+        <p:cNvPr id="1" name=""/>
+        <p:cNvGrpSpPr/>
+        <p:nvPr/>
+      </p:nvGrpSpPr>
+      <p:grpSpPr>
+        <a:xfrm>
+          <a:off x="0" y="0"/>
+          <a:ext cx="0" cy="0"/>
+          <a:chOff x="0" y="0"/>
+          <a:chExt cx="0" cy="0"/>
+        </a:xfrm>
+      </p:grpSpPr>
+      <p:sp>
+        <p:nvSpPr>
+          <p:cNvPr id="4" name="Slide Number Placeholder 3"/>
+          <p:cNvSpPr>
+            <a:spLocks noGrp="1"/>
+          </p:cNvSpPr>
+          <p:nvPr>
+            <p:ph type="sldNum" sz="quarter" idx="12"/>
+          </p:nvPr>
+        </p:nvSpPr>
+        <p:spPr/>
+        <p:txBody>
+          <a:bodyPr/>
+          <a:lstStyle/>
+          <a:p>
+            <a:r>
+              <a:rPr lang="en-GB" sz="2000" dirty="0" smtClean="0"/>
+              <a:t>19</a:t>
+            </a:r>
             <a:endParaRPr lang="en-GB" sz="2000" dirty="0"/>
           </a:p>
         </p:txBody>
@@ -6936,10 +7705,17 @@
   <p:clrMapOvr>
     <a:masterClrMapping/>
   </p:clrMapOvr>
+  <p:timing>
+    <p:tnLst>
+      <p:par>
+        <p:cTn id="1" dur="indefinite" restart="never" nodeType="tmRoot"/>
+      </p:par>
+    </p:tnLst>
+  </p:timing>
 </p:sld>
 </file>
 
-<file path=ppt/slides/slide18.xml><?xml version="1.0" encoding="utf-8"?>
+<file path=ppt/slides/slide21.xml><?xml version="1.0" encoding="utf-8"?>
 <p:sld xmlns:a="http://schemas.openxmlformats.org/drawingml/2006/main" xmlns:r="http://schemas.openxmlformats.org/officeDocument/2006/relationships" xmlns:p="http://schemas.openxmlformats.org/presentationml/2006/main">
   <p:cSld>
     <p:spTree>
@@ -6966,68 +7742,170 @@
             <p:ph type="title"/>
           </p:nvPr>
         </p:nvSpPr>
-        <p:spPr>
-          <a:xfrm>
-            <a:off x="457200" y="2934072"/>
-            <a:ext cx="8229600" cy="1143000"/>
-          </a:xfrm>
-        </p:spPr>
+        <p:spPr/>
+        <p:txBody>
+          <a:bodyPr/>
+          <a:lstStyle/>
+          <a:p>
+            <a:r>
+              <a:rPr lang="en-GB" dirty="0" err="1" smtClean="0"/>
+              <a:t>Nutzen</a:t>
+            </a:r>
+            <a:r>
+              <a:rPr lang="en-GB" dirty="0" smtClean="0"/>
+              <a:t> von Augmented Reality</a:t>
+            </a:r>
+            <a:endParaRPr lang="en-GB" dirty="0"/>
+          </a:p>
+        </p:txBody>
+      </p:sp>
+      <p:sp>
+        <p:nvSpPr>
+          <p:cNvPr id="3" name="Content Placeholder 2"/>
+          <p:cNvSpPr>
+            <a:spLocks noGrp="1"/>
+          </p:cNvSpPr>
+          <p:nvPr>
+            <p:ph idx="1"/>
+          </p:nvPr>
+        </p:nvSpPr>
+        <p:spPr/>
         <p:txBody>
           <a:bodyPr>
-            <a:normAutofit fontScale="90000"/>
+            <a:normAutofit/>
           </a:bodyPr>
           <a:lstStyle/>
           <a:p>
             <a:r>
+              <a:rPr lang="en-GB" dirty="0" smtClean="0"/>
+              <a:t>Intuitive </a:t>
+            </a:r>
+            <a:r>
               <a:rPr lang="en-GB" dirty="0" err="1" smtClean="0"/>
-              <a:t>Vielen</a:t>
+              <a:t>Steuerung</a:t>
+            </a:r>
+            <a:endParaRPr lang="en-GB" dirty="0" smtClean="0"/>
+          </a:p>
+          <a:p>
+            <a:pPr marL="0" indent="0">
+              <a:buNone/>
+            </a:pPr>
+            <a:endParaRPr lang="en-GB" dirty="0" smtClean="0"/>
+          </a:p>
+          <a:p>
+            <a:r>
+              <a:rPr lang="en-GB" dirty="0" err="1" smtClean="0"/>
+              <a:t>Einzeichnen</a:t>
             </a:r>
             <a:r>
               <a:rPr lang="en-GB" dirty="0" smtClean="0"/>
-              <a:t> Dank </a:t>
+              <a:t> von </a:t>
             </a:r>
             <a:r>
               <a:rPr lang="en-GB" dirty="0" err="1" smtClean="0"/>
-              <a:t>für</a:t>
+              <a:t>Aktor</a:t>
             </a:r>
             <a:r>
               <a:rPr lang="en-GB" dirty="0" smtClean="0"/>
-              <a:t> </a:t>
+              <a:t>- und </a:t>
             </a:r>
             <a:r>
               <a:rPr lang="en-GB" dirty="0" err="1" smtClean="0"/>
-              <a:t>Ihre</a:t>
-            </a:r>
+              <a:t>Sensorwerte</a:t>
+            </a:r>
+            <a:endParaRPr lang="en-GB" dirty="0" smtClean="0"/>
+          </a:p>
+          <a:p>
+            <a:endParaRPr lang="en-GB" dirty="0" smtClean="0"/>
+          </a:p>
+          <a:p>
             <a:r>
               <a:rPr lang="en-GB" dirty="0" smtClean="0"/>
-              <a:t> </a:t>
+              <a:t>Simulation der </a:t>
             </a:r>
             <a:r>
               <a:rPr lang="en-GB" dirty="0" err="1" smtClean="0"/>
-              <a:t>Aufmerksamkeit</a:t>
+              <a:t>Roboterbewegung</a:t>
+            </a:r>
+            <a:endParaRPr lang="en-GB" dirty="0" smtClean="0"/>
+          </a:p>
+          <a:p>
+            <a:endParaRPr lang="en-GB" dirty="0" smtClean="0"/>
+          </a:p>
+          <a:p>
+            <a:r>
+              <a:rPr lang="en-GB" dirty="0" err="1" smtClean="0"/>
+              <a:t>Visualisierung</a:t>
             </a:r>
             <a:r>
               <a:rPr lang="en-GB" dirty="0" smtClean="0"/>
-              <a:t>!</a:t>
-            </a:r>
+              <a:t> der </a:t>
+            </a:r>
+            <a:r>
+              <a:rPr lang="en-GB" dirty="0" err="1" smtClean="0"/>
+              <a:t>Schritte</a:t>
+            </a:r>
+            <a:endParaRPr lang="en-GB" dirty="0" smtClean="0"/>
+          </a:p>
+          <a:p>
+            <a:endParaRPr lang="en-GB" dirty="0" smtClean="0"/>
+          </a:p>
+          <a:p>
+            <a:pPr lvl="1"/>
+            <a:endParaRPr lang="en-GB" dirty="0" smtClean="0"/>
+          </a:p>
+          <a:p>
             <a:endParaRPr lang="en-GB" dirty="0"/>
+          </a:p>
+          <a:p>
+            <a:endParaRPr lang="en-GB" dirty="0"/>
+          </a:p>
+        </p:txBody>
+      </p:sp>
+      <p:sp>
+        <p:nvSpPr>
+          <p:cNvPr id="4" name="Slide Number Placeholder 3"/>
+          <p:cNvSpPr>
+            <a:spLocks noGrp="1"/>
+          </p:cNvSpPr>
+          <p:nvPr>
+            <p:ph type="sldNum" sz="quarter" idx="12"/>
+          </p:nvPr>
+        </p:nvSpPr>
+        <p:spPr/>
+        <p:txBody>
+          <a:bodyPr/>
+          <a:lstStyle/>
+          <a:p>
+            <a:r>
+              <a:rPr lang="en-GB" sz="2000" dirty="0" smtClean="0"/>
+              <a:t>20</a:t>
+            </a:r>
+            <a:endParaRPr lang="en-GB" sz="2000" dirty="0"/>
           </a:p>
         </p:txBody>
       </p:sp>
     </p:spTree>
     <p:extLst>
       <p:ext uri="{BB962C8B-B14F-4D97-AF65-F5344CB8AC3E}">
-        <p14:creationId xmlns:p14="http://schemas.microsoft.com/office/powerpoint/2010/main" val="2609658009"/>
+        <p14:creationId xmlns:p14="http://schemas.microsoft.com/office/powerpoint/2010/main" val="546165890"/>
       </p:ext>
     </p:extLst>
   </p:cSld>
   <p:clrMapOvr>
     <a:masterClrMapping/>
   </p:clrMapOvr>
+  <p:timing>
+    <p:tnLst>
+      <p:par>
+        <p:cTn id="1" dur="indefinite" restart="never" nodeType="tmRoot"/>
+      </p:par>
+    </p:tnLst>
+  </p:timing>
 </p:sld>
 </file>
 
-<file path=ppt/slides/slide2.xml><?xml version="1.0" encoding="utf-8"?>
+<file path=ppt/slides/slide22.xml><?xml version="1.0" encoding="utf-8"?>
 <p:sld xmlns:a="http://schemas.openxmlformats.org/drawingml/2006/main" xmlns:r="http://schemas.openxmlformats.org/officeDocument/2006/relationships" xmlns:p="http://schemas.openxmlformats.org/presentationml/2006/main">
   <p:cSld>
     <p:spTree>
@@ -7054,22 +7932,29 @@
             <p:ph type="title"/>
           </p:nvPr>
         </p:nvSpPr>
-        <p:spPr/>
-        <p:txBody>
-          <a:bodyPr/>
+        <p:spPr>
+          <a:xfrm>
+            <a:off x="457200" y="2934072"/>
+            <a:ext cx="8229600" cy="1143000"/>
+          </a:xfrm>
+        </p:spPr>
+        <p:txBody>
+          <a:bodyPr>
+            <a:normAutofit fontScale="90000"/>
+          </a:bodyPr>
           <a:lstStyle/>
           <a:p>
             <a:r>
               <a:rPr lang="en-GB" dirty="0" err="1" smtClean="0"/>
-              <a:t>Sensoren</a:t>
+              <a:t>Vielen</a:t>
             </a:r>
             <a:r>
               <a:rPr lang="en-GB" dirty="0" smtClean="0"/>
-              <a:t> an </a:t>
+              <a:t> Dank </a:t>
             </a:r>
             <a:r>
               <a:rPr lang="en-GB" dirty="0" err="1" smtClean="0"/>
-              <a:t>autonomen</a:t>
+              <a:t>für</a:t>
             </a:r>
             <a:r>
               <a:rPr lang="en-GB" dirty="0" smtClean="0"/>
@@ -7077,76 +7962,41 @@
             </a:r>
             <a:r>
               <a:rPr lang="en-GB" dirty="0" err="1" smtClean="0"/>
-              <a:t>Robotern</a:t>
+              <a:t>Ihre</a:t>
+            </a:r>
+            <a:r>
+              <a:rPr lang="en-GB" dirty="0" smtClean="0"/>
+              <a:t> </a:t>
+            </a:r>
+            <a:r>
+              <a:rPr lang="en-GB" dirty="0" err="1" smtClean="0"/>
+              <a:t>Aufmerksamkeit</a:t>
+            </a:r>
+            <a:r>
+              <a:rPr lang="en-GB" dirty="0" smtClean="0"/>
+              <a:t>!</a:t>
             </a:r>
             <a:endParaRPr lang="en-GB" dirty="0"/>
-          </a:p>
-        </p:txBody>
-      </p:sp>
-      <p:sp>
-        <p:nvSpPr>
-          <p:cNvPr id="3" name="Content Placeholder 2"/>
-          <p:cNvSpPr>
-            <a:spLocks noGrp="1"/>
-          </p:cNvSpPr>
-          <p:nvPr>
-            <p:ph idx="1"/>
-          </p:nvPr>
-        </p:nvSpPr>
-        <p:spPr>
-          <a:xfrm>
-            <a:off x="457200" y="2132856"/>
-            <a:ext cx="8229600" cy="3993307"/>
-          </a:xfrm>
-        </p:spPr>
-        <p:txBody>
-          <a:bodyPr/>
-          <a:lstStyle/>
-          <a:p>
-            <a:pPr marL="0" indent="0">
-              <a:buNone/>
-            </a:pPr>
-            <a:r>
-              <a:rPr lang="de-DE" i="1" dirty="0" smtClean="0"/>
-              <a:t>’Ein autonomer mobiler Roboter ist eine Maschine, die sich in einer natürlichen Umgebung aus eigener Kraft und ohne Hilfestellung von außen bewegen und dabei ein ihr gestelltes Ziel erreichen kann. [...] Dabei erkennt sie die Umwelt, sofern dies notwendig ist, über eigene Sensoren.’ (P. Hoppen)</a:t>
-            </a:r>
-            <a:endParaRPr lang="en-GB" i="1" dirty="0"/>
-          </a:p>
-        </p:txBody>
-      </p:sp>
-      <p:sp>
-        <p:nvSpPr>
-          <p:cNvPr id="4" name="Slide Number Placeholder 3"/>
-          <p:cNvSpPr>
-            <a:spLocks noGrp="1"/>
-          </p:cNvSpPr>
-          <p:nvPr>
-            <p:ph type="sldNum" sz="quarter" idx="12"/>
-          </p:nvPr>
-        </p:nvSpPr>
-        <p:spPr/>
-        <p:txBody>
-          <a:bodyPr/>
-          <a:lstStyle/>
-          <a:p>
-            <a:fld id="{169B6969-B37F-4A17-ACF5-55252B4AE136}" type="slidenum">
-              <a:rPr lang="en-GB" sz="2000" smtClean="0"/>
-              <a:t>2</a:t>
-            </a:fld>
-            <a:endParaRPr lang="en-GB" sz="2000" dirty="0"/>
           </a:p>
         </p:txBody>
       </p:sp>
     </p:spTree>
     <p:extLst>
       <p:ext uri="{BB962C8B-B14F-4D97-AF65-F5344CB8AC3E}">
-        <p14:creationId xmlns:p14="http://schemas.microsoft.com/office/powerpoint/2010/main" val="3680604814"/>
+        <p14:creationId xmlns:p14="http://schemas.microsoft.com/office/powerpoint/2010/main" val="2609658009"/>
       </p:ext>
     </p:extLst>
   </p:cSld>
   <p:clrMapOvr>
     <a:masterClrMapping/>
   </p:clrMapOvr>
+  <p:timing>
+    <p:tnLst>
+      <p:par>
+        <p:cTn id="1" dur="indefinite" restart="never" nodeType="tmRoot"/>
+      </p:par>
+    </p:tnLst>
+  </p:timing>
 </p:sld>
 </file>
 
@@ -7268,7 +8118,27 @@
             </a:r>
             <a:r>
               <a:rPr lang="en-GB" dirty="0" err="1" smtClean="0"/>
-              <a:t>Akkuratheit</a:t>
+              <a:t>Präzision</a:t>
+            </a:r>
+            <a:r>
+              <a:rPr lang="en-GB" dirty="0" smtClean="0"/>
+              <a:t> (</a:t>
+            </a:r>
+            <a:r>
+              <a:rPr lang="en-GB" dirty="0" err="1" smtClean="0"/>
+              <a:t>Übereinstimmungen</a:t>
+            </a:r>
+            <a:r>
+              <a:rPr lang="en-GB" dirty="0" smtClean="0"/>
+              <a:t> </a:t>
+            </a:r>
+            <a:r>
+              <a:rPr lang="en-GB" dirty="0" err="1" smtClean="0"/>
+              <a:t>Messungen</a:t>
+            </a:r>
+            <a:r>
+              <a:rPr lang="en-GB" dirty="0"/>
+              <a:t>)</a:t>
             </a:r>
             <a:endParaRPr lang="en-GB" dirty="0" smtClean="0"/>
           </a:p>
@@ -7285,6 +8155,10 @@
             <a:r>
               <a:rPr lang="en-GB" dirty="0" err="1" smtClean="0"/>
               <a:t>Zeitaufwand</a:t>
+            </a:r>
+            <a:r>
+              <a:rPr lang="en-GB" dirty="0" smtClean="0"/>
+              <a:t> </a:t>
             </a:r>
             <a:endParaRPr lang="en-GB" dirty="0" smtClean="0"/>
           </a:p>
@@ -7368,6 +8242,13 @@
   <p:clrMapOvr>
     <a:masterClrMapping/>
   </p:clrMapOvr>
+  <p:timing>
+    <p:tnLst>
+      <p:par>
+        <p:cTn id="1" dur="indefinite" restart="never" nodeType="tmRoot"/>
+      </p:par>
+    </p:tnLst>
+  </p:timing>
 </p:sld>
 </file>
 
@@ -7485,6 +8366,13 @@
   <p:clrMapOvr>
     <a:masterClrMapping/>
   </p:clrMapOvr>
+  <p:timing>
+    <p:tnLst>
+      <p:par>
+        <p:cTn id="1" dur="indefinite" restart="never" nodeType="tmRoot"/>
+      </p:par>
+    </p:tnLst>
+  </p:timing>
 </p:sld>
 </file>
 
@@ -7696,6 +8584,13 @@
   <p:clrMapOvr>
     <a:masterClrMapping/>
   </p:clrMapOvr>
+  <p:timing>
+    <p:tnLst>
+      <p:par>
+        <p:cTn id="1" dur="indefinite" restart="never" nodeType="tmRoot"/>
+      </p:par>
+    </p:tnLst>
+  </p:timing>
 </p:sld>
 </file>
 
@@ -7882,10 +8777,134 @@
   <p:clrMapOvr>
     <a:masterClrMapping/>
   </p:clrMapOvr>
+  <p:timing>
+    <p:tnLst>
+      <p:par>
+        <p:cTn id="1" dur="indefinite" restart="never" nodeType="tmRoot"/>
+      </p:par>
+    </p:tnLst>
+  </p:timing>
 </p:sld>
 </file>
 
 <file path=ppt/slides/slide7.xml><?xml version="1.0" encoding="utf-8"?>
+<p:sld xmlns:a="http://schemas.openxmlformats.org/drawingml/2006/main" xmlns:r="http://schemas.openxmlformats.org/officeDocument/2006/relationships" xmlns:p="http://schemas.openxmlformats.org/presentationml/2006/main">
+  <p:cSld>
+    <p:spTree>
+      <p:nvGrpSpPr>
+        <p:cNvPr id="1" name=""/>
+        <p:cNvGrpSpPr/>
+        <p:nvPr/>
+      </p:nvGrpSpPr>
+      <p:grpSpPr>
+        <a:xfrm>
+          <a:off x="0" y="0"/>
+          <a:ext cx="0" cy="0"/>
+          <a:chOff x="0" y="0"/>
+          <a:chExt cx="0" cy="0"/>
+        </a:xfrm>
+      </p:grpSpPr>
+      <p:pic>
+        <p:nvPicPr>
+          <p:cNvPr id="7" name="Content Placeholder 6"/>
+          <p:cNvPicPr>
+            <a:picLocks noGrp="1" noChangeAspect="1"/>
+          </p:cNvPicPr>
+          <p:nvPr>
+            <p:ph idx="1"/>
+          </p:nvPr>
+        </p:nvPicPr>
+        <p:blipFill>
+          <a:blip r:embed="rId2">
+            <a:extLst>
+              <a:ext uri="{28A0092B-C50C-407E-A947-70E740481C1C}">
+                <a14:useLocalDpi xmlns:a14="http://schemas.microsoft.com/office/drawing/2010/main" val="0"/>
+              </a:ext>
+            </a:extLst>
+          </a:blip>
+          <a:stretch>
+            <a:fillRect/>
+          </a:stretch>
+        </p:blipFill>
+        <p:spPr>
+          <a:xfrm>
+            <a:off x="35496" y="1165183"/>
+            <a:ext cx="9108504" cy="5692817"/>
+          </a:xfrm>
+        </p:spPr>
+      </p:pic>
+      <p:sp>
+        <p:nvSpPr>
+          <p:cNvPr id="4" name="Slide Number Placeholder 3"/>
+          <p:cNvSpPr>
+            <a:spLocks noGrp="1"/>
+          </p:cNvSpPr>
+          <p:nvPr>
+            <p:ph type="sldNum" sz="quarter" idx="12"/>
+          </p:nvPr>
+        </p:nvSpPr>
+        <p:spPr/>
+        <p:txBody>
+          <a:bodyPr/>
+          <a:lstStyle/>
+          <a:p>
+            <a:fld id="{169B6969-B37F-4A17-ACF5-55252B4AE136}" type="slidenum">
+              <a:rPr lang="en-GB" sz="2000" smtClean="0"/>
+              <a:t>7</a:t>
+            </a:fld>
+            <a:endParaRPr lang="en-GB" sz="2000" dirty="0"/>
+          </a:p>
+        </p:txBody>
+      </p:sp>
+      <p:sp>
+        <p:nvSpPr>
+          <p:cNvPr id="8" name="Title 1"/>
+          <p:cNvSpPr>
+            <a:spLocks noGrp="1"/>
+          </p:cNvSpPr>
+          <p:nvPr>
+            <p:ph type="title"/>
+          </p:nvPr>
+        </p:nvSpPr>
+        <p:spPr>
+          <a:xfrm>
+            <a:off x="457200" y="274638"/>
+            <a:ext cx="8229600" cy="1143000"/>
+          </a:xfrm>
+        </p:spPr>
+        <p:txBody>
+          <a:bodyPr/>
+          <a:lstStyle/>
+          <a:p>
+            <a:r>
+              <a:rPr lang="en-GB" dirty="0" smtClean="0"/>
+              <a:t>Triangulation</a:t>
+            </a:r>
+            <a:endParaRPr lang="en-GB" dirty="0"/>
+          </a:p>
+        </p:txBody>
+      </p:sp>
+    </p:spTree>
+    <p:extLst>
+      <p:ext uri="{BB962C8B-B14F-4D97-AF65-F5344CB8AC3E}">
+        <p14:creationId xmlns:p14="http://schemas.microsoft.com/office/powerpoint/2010/main" val="171382512"/>
+      </p:ext>
+    </p:extLst>
+  </p:cSld>
+  <p:clrMapOvr>
+    <a:masterClrMapping/>
+  </p:clrMapOvr>
+  <p:timing>
+    <p:tnLst>
+      <p:par>
+        <p:cTn id="1" dur="indefinite" restart="never" nodeType="tmRoot"/>
+      </p:par>
+    </p:tnLst>
+  </p:timing>
+</p:sld>
+</file>
+
+<file path=ppt/slides/slide8.xml><?xml version="1.0" encoding="utf-8"?>
 <p:sld xmlns:a="http://schemas.openxmlformats.org/drawingml/2006/main" xmlns:r="http://schemas.openxmlformats.org/officeDocument/2006/relationships" xmlns:p="http://schemas.openxmlformats.org/presentationml/2006/main">
   <p:cSld>
     <p:spTree>
@@ -7983,7 +9002,7 @@
           <a:p>
             <a:fld id="{169B6969-B37F-4A17-ACF5-55252B4AE136}" type="slidenum">
               <a:rPr lang="en-GB" sz="2000" smtClean="0"/>
-              <a:t>7</a:t>
+              <a:t>8</a:t>
             </a:fld>
             <a:endParaRPr lang="en-GB" sz="2000" dirty="0"/>
           </a:p>
@@ -8093,10 +9112,17 @@
   <p:clrMapOvr>
     <a:masterClrMapping/>
   </p:clrMapOvr>
+  <p:timing>
+    <p:tnLst>
+      <p:par>
+        <p:cTn id="1" dur="indefinite" restart="never" nodeType="tmRoot"/>
+      </p:par>
+    </p:tnLst>
+  </p:timing>
 </p:sld>
 </file>
 
-<file path=ppt/slides/slide8.xml><?xml version="1.0" encoding="utf-8"?>
+<file path=ppt/slides/slide9.xml><?xml version="1.0" encoding="utf-8"?>
 <p:sld xmlns:a="http://schemas.openxmlformats.org/drawingml/2006/main" xmlns:r="http://schemas.openxmlformats.org/officeDocument/2006/relationships" xmlns:p="http://schemas.openxmlformats.org/presentationml/2006/main">
   <p:cSld>
     <p:spTree>
@@ -8210,14 +9236,22 @@
             </a:r>
             <a:r>
               <a:rPr lang="en-GB" dirty="0" smtClean="0"/>
-              <a:t> – Potentiometer</a:t>
+              <a:t> – </a:t>
+            </a:r>
+            <a:r>
+              <a:rPr lang="en-GB" dirty="0" err="1" smtClean="0"/>
+              <a:t>Lineares</a:t>
+            </a:r>
+            <a:r>
+              <a:rPr lang="en-GB" dirty="0" smtClean="0"/>
+              <a:t> Potentiometer</a:t>
             </a:r>
           </a:p>
           <a:p>
             <a:pPr lvl="1"/>
             <a:r>
               <a:rPr lang="en-GB" dirty="0" smtClean="0"/>
-              <a:t>Position deer </a:t>
+              <a:t>Position der </a:t>
             </a:r>
             <a:r>
               <a:rPr lang="en-GB" dirty="0" err="1" smtClean="0"/>
@@ -8327,159 +9361,13 @@
   <p:clrMapOvr>
     <a:masterClrMapping/>
   </p:clrMapOvr>
-</p:sld>
-</file>
-
-<file path=ppt/slides/slide9.xml><?xml version="1.0" encoding="utf-8"?>
-<p:sld xmlns:a="http://schemas.openxmlformats.org/drawingml/2006/main" xmlns:r="http://schemas.openxmlformats.org/officeDocument/2006/relationships" xmlns:p="http://schemas.openxmlformats.org/presentationml/2006/main">
-  <p:cSld>
-    <p:spTree>
-      <p:nvGrpSpPr>
-        <p:cNvPr id="1" name=""/>
-        <p:cNvGrpSpPr/>
-        <p:nvPr/>
-      </p:nvGrpSpPr>
-      <p:grpSpPr>
-        <a:xfrm>
-          <a:off x="0" y="0"/>
-          <a:ext cx="0" cy="0"/>
-          <a:chOff x="0" y="0"/>
-          <a:chExt cx="0" cy="0"/>
-        </a:xfrm>
-      </p:grpSpPr>
-      <p:sp>
-        <p:nvSpPr>
-          <p:cNvPr id="2" name="Title 1"/>
-          <p:cNvSpPr>
-            <a:spLocks noGrp="1"/>
-          </p:cNvSpPr>
-          <p:nvPr>
-            <p:ph type="title"/>
-          </p:nvPr>
-        </p:nvSpPr>
-        <p:spPr/>
-        <p:txBody>
-          <a:bodyPr/>
-          <a:lstStyle/>
-          <a:p>
-            <a:r>
-              <a:rPr lang="en-GB" dirty="0" err="1" smtClean="0"/>
-              <a:t>Positionssensoren</a:t>
-            </a:r>
-            <a:endParaRPr lang="en-GB" dirty="0"/>
-          </a:p>
-        </p:txBody>
-      </p:sp>
-      <p:sp>
-        <p:nvSpPr>
-          <p:cNvPr id="4" name="Slide Number Placeholder 3"/>
-          <p:cNvSpPr>
-            <a:spLocks noGrp="1"/>
-          </p:cNvSpPr>
-          <p:nvPr>
-            <p:ph type="sldNum" sz="quarter" idx="12"/>
-          </p:nvPr>
-        </p:nvSpPr>
-        <p:spPr/>
-        <p:txBody>
-          <a:bodyPr/>
-          <a:lstStyle/>
-          <a:p>
-            <a:r>
-              <a:rPr lang="en-GB" sz="2000" dirty="0" smtClean="0"/>
-              <a:t>9</a:t>
-            </a:r>
-            <a:endParaRPr lang="en-GB" sz="2000" dirty="0"/>
-          </a:p>
-        </p:txBody>
-      </p:sp>
-      <p:pic>
-        <p:nvPicPr>
-          <p:cNvPr id="7" name="Picture 6"/>
-          <p:cNvPicPr>
-            <a:picLocks noChangeAspect="1"/>
-          </p:cNvPicPr>
-          <p:nvPr/>
-        </p:nvPicPr>
-        <p:blipFill rotWithShape="1">
-          <a:blip r:embed="rId3" cstate="print">
-            <a:extLst>
-              <a:ext uri="{28A0092B-C50C-407E-A947-70E740481C1C}">
-                <a14:useLocalDpi xmlns:a14="http://schemas.microsoft.com/office/drawing/2010/main" val="0"/>
-              </a:ext>
-            </a:extLst>
-          </a:blip>
-          <a:srcRect l="22438" t="3801" r="15350" b="17451"/>
-          <a:stretch/>
-        </p:blipFill>
-        <p:spPr>
-          <a:xfrm>
-            <a:off x="1475656" y="332656"/>
-            <a:ext cx="6569970" cy="6237312"/>
-          </a:xfrm>
-          <a:prstGeom prst="rect">
-            <a:avLst/>
-          </a:prstGeom>
-        </p:spPr>
-      </p:pic>
-      <p:sp>
-        <p:nvSpPr>
-          <p:cNvPr id="6" name="Right Arrow 5"/>
-          <p:cNvSpPr/>
-          <p:nvPr/>
-        </p:nvSpPr>
-        <p:spPr>
-          <a:xfrm rot="18838342">
-            <a:off x="1474533" y="5068395"/>
-            <a:ext cx="1968420" cy="953992"/>
-          </a:xfrm>
-          <a:prstGeom prst="rightArrow">
-            <a:avLst/>
-          </a:prstGeom>
-          <a:solidFill>
-            <a:srgbClr val="92D050"/>
-          </a:solidFill>
-          <a:ln w="76200">
-            <a:solidFill>
-              <a:srgbClr val="00B050"/>
-            </a:solidFill>
-          </a:ln>
-        </p:spPr>
-        <p:style>
-          <a:lnRef idx="2">
-            <a:schemeClr val="accent1">
-              <a:shade val="50000"/>
-            </a:schemeClr>
-          </a:lnRef>
-          <a:fillRef idx="1">
-            <a:schemeClr val="accent1"/>
-          </a:fillRef>
-          <a:effectRef idx="0">
-            <a:schemeClr val="accent1"/>
-          </a:effectRef>
-          <a:fontRef idx="minor">
-            <a:schemeClr val="lt1"/>
-          </a:fontRef>
-        </p:style>
-        <p:txBody>
-          <a:bodyPr rtlCol="0" anchor="ctr"/>
-          <a:lstStyle/>
-          <a:p>
-            <a:pPr algn="ctr"/>
-            <a:endParaRPr lang="en-GB"/>
-          </a:p>
-        </p:txBody>
-      </p:sp>
-    </p:spTree>
-    <p:extLst>
-      <p:ext uri="{BB962C8B-B14F-4D97-AF65-F5344CB8AC3E}">
-        <p14:creationId xmlns:p14="http://schemas.microsoft.com/office/powerpoint/2010/main" val="2056909074"/>
-      </p:ext>
-    </p:extLst>
-  </p:cSld>
-  <p:clrMapOvr>
-    <a:masterClrMapping/>
-  </p:clrMapOvr>
+  <p:timing>
+    <p:tnLst>
+      <p:par>
+        <p:cTn id="1" dur="indefinite" restart="never" nodeType="tmRoot"/>
+      </p:par>
+    </p:tnLst>
+  </p:timing>
 </p:sld>
 </file>
 

</xml_diff>